<commit_message>
Atualização da parte dos protipos de baixa fidelidade.
</commit_message>
<xml_diff>
--- a/documentacao/G4_Apresentacao2sem2014.pptx
+++ b/documentacao/G4_Apresentacao2sem2014.pptx
@@ -5,10 +5,10 @@
     <p:sldMasterId id="2147483657" r:id="rId1"/>
   </p:sldMasterIdLst>
   <p:notesMasterIdLst>
-    <p:notesMasterId r:id="rId33"/>
+    <p:notesMasterId r:id="rId44"/>
   </p:notesMasterIdLst>
   <p:handoutMasterIdLst>
-    <p:handoutMasterId r:id="rId34"/>
+    <p:handoutMasterId r:id="rId45"/>
   </p:handoutMasterIdLst>
   <p:sldIdLst>
     <p:sldId id="256" r:id="rId2"/>
@@ -30,18 +30,29 @@
     <p:sldId id="276" r:id="rId18"/>
     <p:sldId id="277" r:id="rId19"/>
     <p:sldId id="279" r:id="rId20"/>
-    <p:sldId id="275" r:id="rId21"/>
-    <p:sldId id="280" r:id="rId22"/>
-    <p:sldId id="282" r:id="rId23"/>
-    <p:sldId id="283" r:id="rId24"/>
-    <p:sldId id="284" r:id="rId25"/>
-    <p:sldId id="285" r:id="rId26"/>
-    <p:sldId id="286" r:id="rId27"/>
-    <p:sldId id="287" r:id="rId28"/>
-    <p:sldId id="288" r:id="rId29"/>
-    <p:sldId id="289" r:id="rId30"/>
-    <p:sldId id="290" r:id="rId31"/>
-    <p:sldId id="263" r:id="rId32"/>
+    <p:sldId id="280" r:id="rId21"/>
+    <p:sldId id="275" r:id="rId22"/>
+    <p:sldId id="293" r:id="rId23"/>
+    <p:sldId id="294" r:id="rId24"/>
+    <p:sldId id="295" r:id="rId25"/>
+    <p:sldId id="296" r:id="rId26"/>
+    <p:sldId id="297" r:id="rId27"/>
+    <p:sldId id="298" r:id="rId28"/>
+    <p:sldId id="299" r:id="rId29"/>
+    <p:sldId id="300" r:id="rId30"/>
+    <p:sldId id="282" r:id="rId31"/>
+    <p:sldId id="283" r:id="rId32"/>
+    <p:sldId id="284" r:id="rId33"/>
+    <p:sldId id="285" r:id="rId34"/>
+    <p:sldId id="286" r:id="rId35"/>
+    <p:sldId id="287" r:id="rId36"/>
+    <p:sldId id="301" r:id="rId37"/>
+    <p:sldId id="288" r:id="rId38"/>
+    <p:sldId id="289" r:id="rId39"/>
+    <p:sldId id="290" r:id="rId40"/>
+    <p:sldId id="291" r:id="rId41"/>
+    <p:sldId id="292" r:id="rId42"/>
+    <p:sldId id="263" r:id="rId43"/>
   </p:sldIdLst>
   <p:sldSz cx="9144000" cy="6858000" type="screen4x3"/>
   <p:notesSz cx="7010400" cy="9296400"/>
@@ -170,6 +181,36 @@
       </a:defRPr>
     </a:lvl9pPr>
   </p:defaultTextStyle>
+  <p:extLst>
+    <p:ext uri="{EFAFB233-063F-42B5-8137-9DF3F51BA10A}">
+      <p15:sldGuideLst xmlns:p15="http://schemas.microsoft.com/office/powerpoint/2012/main">
+        <p15:guide id="1" orient="horz" pos="2160">
+          <p15:clr>
+            <a:srgbClr val="A4A3A4"/>
+          </p15:clr>
+        </p15:guide>
+        <p15:guide id="2" pos="2880">
+          <p15:clr>
+            <a:srgbClr val="A4A3A4"/>
+          </p15:clr>
+        </p15:guide>
+      </p15:sldGuideLst>
+    </p:ext>
+    <p:ext uri="{2D200454-40CA-4A62-9FC3-DE9A4176ACB9}">
+      <p15:notesGuideLst xmlns:p15="http://schemas.microsoft.com/office/powerpoint/2012/main">
+        <p15:guide id="1" orient="horz" pos="2928">
+          <p15:clr>
+            <a:srgbClr val="A4A3A4"/>
+          </p15:clr>
+        </p15:guide>
+        <p15:guide id="2" pos="2208">
+          <p15:clr>
+            <a:srgbClr val="A4A3A4"/>
+          </p15:clr>
+        </p15:guide>
+      </p15:notesGuideLst>
+    </p:ext>
+  </p:extLst>
 </p:presentation>
 </file>
 
@@ -256,7 +297,7 @@
             <a:fld id="{387DC7E4-63C1-42C9-AC56-2D8DD4349572}" type="datetimeFigureOut">
               <a:rPr lang="pt-BR" smtClean="0"/>
               <a:pPr/>
-              <a:t>20/09/2014</a:t>
+              <a:t>22/09/2014</a:t>
             </a:fld>
             <a:endParaRPr lang="pt-BR"/>
           </a:p>
@@ -332,7 +373,7 @@
     </p:spTree>
     <p:extLst>
       <p:ext uri="{BB962C8B-B14F-4D97-AF65-F5344CB8AC3E}">
-        <p14:creationId xmlns:p14="http://schemas.microsoft.com/office/powerpoint/2010/main" xmlns="" val="3690707936"/>
+        <p14:creationId xmlns:p14="http://schemas.microsoft.com/office/powerpoint/2010/main" val="3690707936"/>
       </p:ext>
     </p:extLst>
   </p:cSld>
@@ -646,7 +687,7 @@
     </p:spTree>
     <p:extLst>
       <p:ext uri="{BB962C8B-B14F-4D97-AF65-F5344CB8AC3E}">
-        <p14:creationId xmlns:p14="http://schemas.microsoft.com/office/powerpoint/2010/main" xmlns="" val="753547333"/>
+        <p14:creationId xmlns:p14="http://schemas.microsoft.com/office/powerpoint/2010/main" val="753547333"/>
       </p:ext>
     </p:extLst>
   </p:cSld>
@@ -853,6 +894,11 @@
         </p:txBody>
       </p:sp>
     </p:spTree>
+    <p:extLst>
+      <p:ext uri="{BB962C8B-B14F-4D97-AF65-F5344CB8AC3E}">
+        <p14:creationId xmlns:p14="http://schemas.microsoft.com/office/powerpoint/2010/main" val="344508090"/>
+      </p:ext>
+    </p:extLst>
   </p:cSld>
   <p:clrMapOvr>
     <a:masterClrMapping/>
@@ -4922,15 +4968,7 @@
           <a:p>
             <a:r>
               <a:rPr lang="pt-BR" sz="5400" dirty="0" smtClean="0"/>
-              <a:t>SISTEMA DE </a:t>
-            </a:r>
-            <a:r>
-              <a:rPr lang="pt-BR" sz="5400" dirty="0" smtClean="0"/>
-              <a:t>GERENCIAMENTO </a:t>
-            </a:r>
-            <a:r>
-              <a:rPr lang="pt-BR" sz="5400" dirty="0" smtClean="0"/>
-              <a:t>DE EXAMES</a:t>
+              <a:t>SISTEMA DE GERENCIAMENTO DE EXAMES</a:t>
             </a:r>
             <a:endParaRPr lang="pt-BR" sz="5400" dirty="0"/>
           </a:p>
@@ -5008,7 +5046,6 @@
               <a:rPr lang="pt-BR" dirty="0" smtClean="0"/>
               <a:t>22/09/2014</a:t>
             </a:r>
-            <a:endParaRPr lang="pt-BR" dirty="0" smtClean="0"/>
           </a:p>
           <a:p>
             <a:endParaRPr lang="pt-BR" dirty="0"/>
@@ -5192,11 +5229,7 @@
           <a:p>
             <a:r>
               <a:rPr lang="pt-BR" dirty="0" smtClean="0"/>
-              <a:t>IBTA </a:t>
-            </a:r>
-            <a:r>
-              <a:rPr lang="pt-BR" dirty="0" smtClean="0"/>
-              <a:t>Faculdades</a:t>
+              <a:t>IBTA Faculdades</a:t>
             </a:r>
           </a:p>
           <a:p>
@@ -5220,7 +5253,7 @@
           <a:blip r:embed="rId2" cstate="print">
             <a:extLst>
               <a:ext uri="{28A0092B-C50C-407E-A947-70E740481C1C}">
-                <a14:useLocalDpi xmlns:a14="http://schemas.microsoft.com/office/drawing/2010/main" xmlns:lc="http://schemas.openxmlformats.org/drawingml/2006/lockedCanvas" xmlns="" val="0"/>
+                <a14:useLocalDpi xmlns:a14="http://schemas.microsoft.com/office/drawing/2010/main" val="0"/>
               </a:ext>
             </a:extLst>
           </a:blip>
@@ -5362,11 +5395,7 @@
           <a:p>
             <a:r>
               <a:rPr lang="pt-BR" dirty="0" smtClean="0"/>
-              <a:t>IBTA </a:t>
-            </a:r>
-            <a:r>
-              <a:rPr lang="pt-BR" dirty="0" smtClean="0"/>
-              <a:t>Faculdades</a:t>
+              <a:t>IBTA Faculdades</a:t>
             </a:r>
           </a:p>
           <a:p>
@@ -5390,7 +5419,7 @@
           <a:blip r:embed="rId2" cstate="print">
             <a:extLst>
               <a:ext uri="{28A0092B-C50C-407E-A947-70E740481C1C}">
-                <a14:useLocalDpi xmlns:a14="http://schemas.microsoft.com/office/drawing/2010/main" xmlns:lc="http://schemas.openxmlformats.org/drawingml/2006/lockedCanvas" xmlns="" val="0"/>
+                <a14:useLocalDpi xmlns:a14="http://schemas.microsoft.com/office/drawing/2010/main" val="0"/>
               </a:ext>
             </a:extLst>
           </a:blip>
@@ -5574,11 +5603,7 @@
           <a:p>
             <a:r>
               <a:rPr lang="pt-BR" dirty="0" smtClean="0"/>
-              <a:t>IBTA </a:t>
-            </a:r>
-            <a:r>
-              <a:rPr lang="pt-BR" dirty="0" smtClean="0"/>
-              <a:t>Faculdades</a:t>
+              <a:t>IBTA Faculdades</a:t>
             </a:r>
           </a:p>
           <a:p>
@@ -5602,7 +5627,7 @@
           <a:blip r:embed="rId2" cstate="print">
             <a:extLst>
               <a:ext uri="{28A0092B-C50C-407E-A947-70E740481C1C}">
-                <a14:useLocalDpi xmlns:a14="http://schemas.microsoft.com/office/drawing/2010/main" xmlns:lc="http://schemas.openxmlformats.org/drawingml/2006/lockedCanvas" xmlns="" val="0"/>
+                <a14:useLocalDpi xmlns:a14="http://schemas.microsoft.com/office/drawing/2010/main" val="0"/>
               </a:ext>
             </a:extLst>
           </a:blip>
@@ -5632,7 +5657,7 @@
           <a:blip r:embed="rId3" cstate="print">
             <a:extLst>
               <a:ext uri="{28A0092B-C50C-407E-A947-70E740481C1C}">
-                <a14:useLocalDpi xmlns:a14="http://schemas.microsoft.com/office/drawing/2010/main" xmlns:lc="http://schemas.openxmlformats.org/drawingml/2006/lockedCanvas" xmlns="" val="0"/>
+                <a14:useLocalDpi xmlns:a14="http://schemas.microsoft.com/office/drawing/2010/main" val="0"/>
               </a:ext>
             </a:extLst>
           </a:blip>
@@ -5662,7 +5687,7 @@
           <a:blip r:embed="rId4" cstate="print">
             <a:extLst>
               <a:ext uri="{28A0092B-C50C-407E-A947-70E740481C1C}">
-                <a14:useLocalDpi xmlns:a14="http://schemas.microsoft.com/office/drawing/2010/main" xmlns:lc="http://schemas.openxmlformats.org/drawingml/2006/lockedCanvas" xmlns="" val="0"/>
+                <a14:useLocalDpi xmlns:a14="http://schemas.microsoft.com/office/drawing/2010/main" val="0"/>
               </a:ext>
             </a:extLst>
           </a:blip>
@@ -5841,11 +5866,7 @@
           <a:p>
             <a:r>
               <a:rPr lang="pt-BR" dirty="0" smtClean="0"/>
-              <a:t>IBTA </a:t>
-            </a:r>
-            <a:r>
-              <a:rPr lang="pt-BR" dirty="0" smtClean="0"/>
-              <a:t>Faculdades</a:t>
+              <a:t>IBTA Faculdades</a:t>
             </a:r>
           </a:p>
           <a:p>
@@ -5869,7 +5890,7 @@
           <a:blip r:embed="rId2" cstate="print">
             <a:extLst>
               <a:ext uri="{28A0092B-C50C-407E-A947-70E740481C1C}">
-                <a14:useLocalDpi xmlns:a14="http://schemas.microsoft.com/office/drawing/2010/main" xmlns:lc="http://schemas.openxmlformats.org/drawingml/2006/lockedCanvas" xmlns="" val="0"/>
+                <a14:useLocalDpi xmlns:a14="http://schemas.microsoft.com/office/drawing/2010/main" val="0"/>
               </a:ext>
             </a:extLst>
           </a:blip>
@@ -6011,11 +6032,7 @@
           <a:p>
             <a:r>
               <a:rPr lang="pt-BR" dirty="0" smtClean="0"/>
-              <a:t>IBTA </a:t>
-            </a:r>
-            <a:r>
-              <a:rPr lang="pt-BR" dirty="0" smtClean="0"/>
-              <a:t>Faculdades</a:t>
+              <a:t>IBTA Faculdades</a:t>
             </a:r>
           </a:p>
           <a:p>
@@ -6029,30 +6046,63 @@
       </p:sp>
       <p:pic>
         <p:nvPicPr>
-          <p:cNvPr id="5122" name="Picture 2" descr="C:\Users\'\Desktop\Projeto de baixa fidelidade\Projeto de baixa fidelidade\Paciente\inicio.png"/>
+          <p:cNvPr id="2" name="Imagem 1"/>
           <p:cNvPicPr>
-            <a:picLocks noChangeAspect="1" noChangeArrowheads="1"/>
+            <a:picLocks noChangeAspect="1"/>
           </p:cNvPicPr>
           <p:nvPr/>
         </p:nvPicPr>
         <p:blipFill>
-          <a:blip r:embed="rId2" cstate="print"/>
-          <a:srcRect l="4300" r="3041" b="6577"/>
+          <a:blip r:embed="rId2">
+            <a:extLst>
+              <a:ext uri="{28A0092B-C50C-407E-A947-70E740481C1C}">
+                <a14:useLocalDpi xmlns:a14="http://schemas.microsoft.com/office/drawing/2010/main" val="0"/>
+              </a:ext>
+            </a:extLst>
+          </a:blip>
           <a:stretch>
             <a:fillRect/>
           </a:stretch>
         </p:blipFill>
-        <p:spPr bwMode="auto">
+        <p:spPr>
           <a:xfrm>
-            <a:off x="1979712" y="1458906"/>
-            <a:ext cx="5184576" cy="4869292"/>
+            <a:off x="1773953" y="1442422"/>
+            <a:ext cx="5596094" cy="5212800"/>
           </a:xfrm>
           <a:prstGeom prst="rect">
             <a:avLst/>
           </a:prstGeom>
-          <a:noFill/>
         </p:spPr>
       </p:pic>
+      <p:sp>
+        <p:nvSpPr>
+          <p:cNvPr id="3" name="Retângulo 2"/>
+          <p:cNvSpPr/>
+          <p:nvPr/>
+        </p:nvSpPr>
+        <p:spPr>
+          <a:xfrm>
+            <a:off x="304800" y="1700808"/>
+            <a:ext cx="4572000" cy="369332"/>
+          </a:xfrm>
+          <a:prstGeom prst="rect">
+            <a:avLst/>
+          </a:prstGeom>
+        </p:spPr>
+        <p:txBody>
+          <a:bodyPr>
+            <a:spAutoFit/>
+          </a:bodyPr>
+          <a:lstStyle/>
+          <a:p>
+            <a:r>
+              <a:rPr lang="pt-BR" dirty="0" smtClean="0"/>
+              <a:t>Telas Paciente</a:t>
+            </a:r>
+            <a:endParaRPr lang="pt-BR" dirty="0"/>
+          </a:p>
+        </p:txBody>
+      </p:sp>
     </p:spTree>
   </p:cSld>
   <p:clrMapOvr>
@@ -6177,11 +6227,7 @@
           <a:p>
             <a:r>
               <a:rPr lang="pt-BR" dirty="0" smtClean="0"/>
-              <a:t>IBTA </a:t>
-            </a:r>
-            <a:r>
-              <a:rPr lang="pt-BR" dirty="0" smtClean="0"/>
-              <a:t>Faculdades</a:t>
+              <a:t>IBTA Faculdades</a:t>
             </a:r>
           </a:p>
           <a:p>
@@ -6195,30 +6241,63 @@
       </p:sp>
       <p:pic>
         <p:nvPicPr>
-          <p:cNvPr id="8194" name="Picture 2" descr="C:\Users\'\Desktop\Projeto de baixa fidelidade\Projeto de baixa fidelidade\Paciente\consulta.png"/>
+          <p:cNvPr id="2" name="Imagem 1"/>
           <p:cNvPicPr>
-            <a:picLocks noChangeAspect="1" noChangeArrowheads="1"/>
+            <a:picLocks noChangeAspect="1"/>
           </p:cNvPicPr>
           <p:nvPr/>
         </p:nvPicPr>
         <p:blipFill>
-          <a:blip r:embed="rId2" cstate="print"/>
-          <a:srcRect/>
+          <a:blip r:embed="rId2">
+            <a:extLst>
+              <a:ext uri="{28A0092B-C50C-407E-A947-70E740481C1C}">
+                <a14:useLocalDpi xmlns:a14="http://schemas.microsoft.com/office/drawing/2010/main" val="0"/>
+              </a:ext>
+            </a:extLst>
+          </a:blip>
           <a:stretch>
             <a:fillRect/>
           </a:stretch>
         </p:blipFill>
-        <p:spPr bwMode="auto">
+        <p:spPr>
           <a:xfrm>
-            <a:off x="1774338" y="1441351"/>
-            <a:ext cx="5595324" cy="5212080"/>
+            <a:off x="1773953" y="1456560"/>
+            <a:ext cx="5596094" cy="5212800"/>
           </a:xfrm>
           <a:prstGeom prst="rect">
             <a:avLst/>
           </a:prstGeom>
-          <a:noFill/>
         </p:spPr>
       </p:pic>
+      <p:sp>
+        <p:nvSpPr>
+          <p:cNvPr id="9" name="Retângulo 8"/>
+          <p:cNvSpPr/>
+          <p:nvPr/>
+        </p:nvSpPr>
+        <p:spPr>
+          <a:xfrm>
+            <a:off x="304800" y="1700808"/>
+            <a:ext cx="4572000" cy="369332"/>
+          </a:xfrm>
+          <a:prstGeom prst="rect">
+            <a:avLst/>
+          </a:prstGeom>
+        </p:spPr>
+        <p:txBody>
+          <a:bodyPr>
+            <a:spAutoFit/>
+          </a:bodyPr>
+          <a:lstStyle/>
+          <a:p>
+            <a:r>
+              <a:rPr lang="pt-BR" dirty="0" smtClean="0"/>
+              <a:t>Telas Paciente</a:t>
+            </a:r>
+            <a:endParaRPr lang="pt-BR" dirty="0"/>
+          </a:p>
+        </p:txBody>
+      </p:sp>
     </p:spTree>
   </p:cSld>
   <p:clrMapOvr>
@@ -6343,11 +6422,7 @@
           <a:p>
             <a:r>
               <a:rPr lang="pt-BR" dirty="0" smtClean="0"/>
-              <a:t>IBTA </a:t>
-            </a:r>
-            <a:r>
-              <a:rPr lang="pt-BR" dirty="0" smtClean="0"/>
-              <a:t>Faculdades</a:t>
+              <a:t>IBTA Faculdades</a:t>
             </a:r>
           </a:p>
           <a:p>
@@ -6361,30 +6436,63 @@
       </p:sp>
       <p:pic>
         <p:nvPicPr>
-          <p:cNvPr id="11266" name="Picture 2" descr="C:\Users\'\Desktop\Projeto de baixa fidelidade\Projeto de baixa fidelidade\Paciente\exame_web.png"/>
+          <p:cNvPr id="2" name="Imagem 1"/>
           <p:cNvPicPr>
-            <a:picLocks noChangeAspect="1" noChangeArrowheads="1"/>
+            <a:picLocks noChangeAspect="1"/>
           </p:cNvPicPr>
           <p:nvPr/>
         </p:nvPicPr>
         <p:blipFill>
-          <a:blip r:embed="rId2" cstate="print"/>
-          <a:srcRect/>
+          <a:blip r:embed="rId2">
+            <a:extLst>
+              <a:ext uri="{28A0092B-C50C-407E-A947-70E740481C1C}">
+                <a14:useLocalDpi xmlns:a14="http://schemas.microsoft.com/office/drawing/2010/main" val="0"/>
+              </a:ext>
+            </a:extLst>
+          </a:blip>
           <a:stretch>
             <a:fillRect/>
           </a:stretch>
         </p:blipFill>
-        <p:spPr bwMode="auto">
+        <p:spPr>
           <a:xfrm>
-            <a:off x="1813814" y="1412776"/>
-            <a:ext cx="5516373" cy="5138539"/>
+            <a:off x="1773953" y="1456560"/>
+            <a:ext cx="5596094" cy="5212800"/>
           </a:xfrm>
           <a:prstGeom prst="rect">
             <a:avLst/>
           </a:prstGeom>
-          <a:noFill/>
         </p:spPr>
       </p:pic>
+      <p:sp>
+        <p:nvSpPr>
+          <p:cNvPr id="9" name="Retângulo 8"/>
+          <p:cNvSpPr/>
+          <p:nvPr/>
+        </p:nvSpPr>
+        <p:spPr>
+          <a:xfrm>
+            <a:off x="304800" y="1700808"/>
+            <a:ext cx="4572000" cy="369332"/>
+          </a:xfrm>
+          <a:prstGeom prst="rect">
+            <a:avLst/>
+          </a:prstGeom>
+        </p:spPr>
+        <p:txBody>
+          <a:bodyPr>
+            <a:spAutoFit/>
+          </a:bodyPr>
+          <a:lstStyle/>
+          <a:p>
+            <a:r>
+              <a:rPr lang="pt-BR" dirty="0" smtClean="0"/>
+              <a:t>Telas Paciente</a:t>
+            </a:r>
+            <a:endParaRPr lang="pt-BR" dirty="0"/>
+          </a:p>
+        </p:txBody>
+      </p:sp>
     </p:spTree>
   </p:cSld>
   <p:clrMapOvr>
@@ -6509,11 +6617,7 @@
           <a:p>
             <a:r>
               <a:rPr lang="pt-BR" dirty="0" smtClean="0"/>
-              <a:t>IBTA </a:t>
-            </a:r>
-            <a:r>
-              <a:rPr lang="pt-BR" dirty="0" smtClean="0"/>
-              <a:t>Faculdades</a:t>
+              <a:t>IBTA Faculdades</a:t>
             </a:r>
           </a:p>
           <a:p>
@@ -6527,30 +6631,63 @@
       </p:sp>
       <p:pic>
         <p:nvPicPr>
-          <p:cNvPr id="7171" name="Picture 3" descr="C:\Users\'\Desktop\Projeto de baixa fidelidade\Projeto de baixa fidelidade\Paciente\exames.png"/>
+          <p:cNvPr id="2" name="Imagem 1"/>
           <p:cNvPicPr>
-            <a:picLocks noChangeAspect="1" noChangeArrowheads="1"/>
+            <a:picLocks noChangeAspect="1"/>
           </p:cNvPicPr>
           <p:nvPr/>
         </p:nvPicPr>
         <p:blipFill>
-          <a:blip r:embed="rId2" cstate="print"/>
-          <a:srcRect/>
+          <a:blip r:embed="rId2">
+            <a:extLst>
+              <a:ext uri="{28A0092B-C50C-407E-A947-70E740481C1C}">
+                <a14:useLocalDpi xmlns:a14="http://schemas.microsoft.com/office/drawing/2010/main" val="0"/>
+              </a:ext>
+            </a:extLst>
+          </a:blip>
           <a:stretch>
             <a:fillRect/>
           </a:stretch>
         </p:blipFill>
-        <p:spPr bwMode="auto">
+        <p:spPr>
           <a:xfrm>
-            <a:off x="1774338" y="1457280"/>
-            <a:ext cx="5595324" cy="5212080"/>
+            <a:off x="1773953" y="1456560"/>
+            <a:ext cx="5596094" cy="5212800"/>
           </a:xfrm>
           <a:prstGeom prst="rect">
             <a:avLst/>
           </a:prstGeom>
-          <a:noFill/>
         </p:spPr>
       </p:pic>
+      <p:sp>
+        <p:nvSpPr>
+          <p:cNvPr id="9" name="Retângulo 8"/>
+          <p:cNvSpPr/>
+          <p:nvPr/>
+        </p:nvSpPr>
+        <p:spPr>
+          <a:xfrm>
+            <a:off x="304800" y="1700808"/>
+            <a:ext cx="4572000" cy="369332"/>
+          </a:xfrm>
+          <a:prstGeom prst="rect">
+            <a:avLst/>
+          </a:prstGeom>
+        </p:spPr>
+        <p:txBody>
+          <a:bodyPr>
+            <a:spAutoFit/>
+          </a:bodyPr>
+          <a:lstStyle/>
+          <a:p>
+            <a:r>
+              <a:rPr lang="pt-BR" dirty="0" smtClean="0"/>
+              <a:t>Telas Paciente</a:t>
+            </a:r>
+            <a:endParaRPr lang="pt-BR" dirty="0"/>
+          </a:p>
+        </p:txBody>
+      </p:sp>
     </p:spTree>
   </p:cSld>
   <p:clrMapOvr>
@@ -6675,11 +6812,7 @@
           <a:p>
             <a:r>
               <a:rPr lang="pt-BR" dirty="0" smtClean="0"/>
-              <a:t>IBTA </a:t>
-            </a:r>
-            <a:r>
-              <a:rPr lang="pt-BR" dirty="0" smtClean="0"/>
-              <a:t>Faculdades</a:t>
+              <a:t>IBTA Faculdades</a:t>
             </a:r>
           </a:p>
           <a:p>
@@ -6717,6 +6850,35 @@
           <a:noFill/>
         </p:spPr>
       </p:pic>
+      <p:sp>
+        <p:nvSpPr>
+          <p:cNvPr id="9" name="Retângulo 8"/>
+          <p:cNvSpPr/>
+          <p:nvPr/>
+        </p:nvSpPr>
+        <p:spPr>
+          <a:xfrm>
+            <a:off x="304800" y="1700808"/>
+            <a:ext cx="4572000" cy="369332"/>
+          </a:xfrm>
+          <a:prstGeom prst="rect">
+            <a:avLst/>
+          </a:prstGeom>
+        </p:spPr>
+        <p:txBody>
+          <a:bodyPr>
+            <a:spAutoFit/>
+          </a:bodyPr>
+          <a:lstStyle/>
+          <a:p>
+            <a:r>
+              <a:rPr lang="pt-BR" dirty="0" smtClean="0"/>
+              <a:t>Telas Paciente</a:t>
+            </a:r>
+            <a:endParaRPr lang="pt-BR" dirty="0"/>
+          </a:p>
+        </p:txBody>
+      </p:sp>
     </p:spTree>
   </p:cSld>
   <p:clrMapOvr>
@@ -6841,11 +7003,7 @@
           <a:p>
             <a:r>
               <a:rPr lang="pt-BR" dirty="0" smtClean="0"/>
-              <a:t>IBTA </a:t>
-            </a:r>
-            <a:r>
-              <a:rPr lang="pt-BR" dirty="0" smtClean="0"/>
-              <a:t>Faculdades</a:t>
+              <a:t>IBTA Faculdades</a:t>
             </a:r>
           </a:p>
           <a:p>
@@ -6874,7 +7032,7 @@
         </p:blipFill>
         <p:spPr bwMode="auto">
           <a:xfrm>
-            <a:off x="1979712" y="1484784"/>
+            <a:off x="1827754" y="1484784"/>
             <a:ext cx="5488492" cy="5112568"/>
           </a:xfrm>
           <a:prstGeom prst="rect">
@@ -6883,6 +7041,35 @@
           <a:noFill/>
         </p:spPr>
       </p:pic>
+      <p:sp>
+        <p:nvSpPr>
+          <p:cNvPr id="9" name="Retângulo 8"/>
+          <p:cNvSpPr/>
+          <p:nvPr/>
+        </p:nvSpPr>
+        <p:spPr>
+          <a:xfrm>
+            <a:off x="304800" y="1700808"/>
+            <a:ext cx="4572000" cy="369332"/>
+          </a:xfrm>
+          <a:prstGeom prst="rect">
+            <a:avLst/>
+          </a:prstGeom>
+        </p:spPr>
+        <p:txBody>
+          <a:bodyPr>
+            <a:spAutoFit/>
+          </a:bodyPr>
+          <a:lstStyle/>
+          <a:p>
+            <a:r>
+              <a:rPr lang="pt-BR" dirty="0" smtClean="0"/>
+              <a:t>Telas Paciente</a:t>
+            </a:r>
+            <a:endParaRPr lang="pt-BR" dirty="0"/>
+          </a:p>
+        </p:txBody>
+      </p:sp>
     </p:spTree>
   </p:cSld>
   <p:clrMapOvr>
@@ -6958,46 +7145,20 @@
           <a:p>
             <a:r>
               <a:rPr lang="pt-BR" sz="2400" dirty="0" smtClean="0"/>
-              <a:t>Sistema de gerenciamento, gestão e controle </a:t>
-            </a:r>
+              <a:t>Sistema de gerenciamento, gestão e controle de exames, visando facilidade e praticidade para o paciente.</a:t>
+            </a:r>
+          </a:p>
+          <a:p>
             <a:r>
               <a:rPr lang="pt-BR" sz="2400" dirty="0" smtClean="0"/>
-              <a:t>de </a:t>
-            </a:r>
+              <a:t>Usuários: Paciente, Gestor e Administrador.</a:t>
+            </a:r>
+          </a:p>
+          <a:p>
             <a:r>
               <a:rPr lang="pt-BR" sz="2400" dirty="0" smtClean="0"/>
-              <a:t>exames, visando facilidade e praticidade para o </a:t>
-            </a:r>
-            <a:r>
-              <a:rPr lang="pt-BR" sz="2400" dirty="0" smtClean="0"/>
-              <a:t>paciente.</a:t>
-            </a:r>
-            <a:endParaRPr lang="pt-BR" sz="2400" dirty="0" smtClean="0"/>
-          </a:p>
-          <a:p>
-            <a:r>
-              <a:rPr lang="pt-BR" sz="2400" dirty="0" smtClean="0"/>
-              <a:t>Usuários</a:t>
-            </a:r>
-            <a:r>
-              <a:rPr lang="pt-BR" sz="2400" dirty="0" smtClean="0"/>
-              <a:t>: Paciente, Gestor e Administrador</a:t>
-            </a:r>
-            <a:r>
-              <a:rPr lang="pt-BR" sz="2400" dirty="0" smtClean="0"/>
-              <a:t>.</a:t>
-            </a:r>
-          </a:p>
-          <a:p>
-            <a:r>
-              <a:rPr lang="pt-BR" sz="2400" dirty="0" smtClean="0"/>
-              <a:t>Ambientes: </a:t>
-            </a:r>
-            <a:r>
-              <a:rPr lang="pt-BR" sz="2400" dirty="0" smtClean="0"/>
-              <a:t>WebSite.</a:t>
-            </a:r>
-            <a:endParaRPr lang="pt-BR" sz="2400" dirty="0" smtClean="0"/>
+              <a:t>Ambientes: WebSite.</a:t>
+            </a:r>
           </a:p>
           <a:p>
             <a:pPr>
@@ -7209,11 +7370,7 @@
           <a:p>
             <a:r>
               <a:rPr lang="pt-BR" dirty="0" smtClean="0"/>
-              <a:t>IBTA </a:t>
-            </a:r>
-            <a:r>
-              <a:rPr lang="pt-BR" dirty="0" smtClean="0"/>
-              <a:t>Faculdades</a:t>
+              <a:t>IBTA Faculdades</a:t>
             </a:r>
           </a:p>
           <a:p>
@@ -7227,7 +7384,7 @@
       </p:sp>
       <p:pic>
         <p:nvPicPr>
-          <p:cNvPr id="6146" name="Picture 2" descr="C:\Users\'\Desktop\Projeto de baixa fidelidade\Projeto de baixa fidelidade\Paciente\inicio - Erro.png"/>
+          <p:cNvPr id="12290" name="Picture 2" descr="C:\Users\'\Desktop\Projeto de baixa fidelidade\Projeto de baixa fidelidade\Paciente\Contato - Erro.png"/>
           <p:cNvPicPr>
             <a:picLocks noChangeAspect="1" noChangeArrowheads="1"/>
           </p:cNvPicPr>
@@ -7235,15 +7392,15 @@
         </p:nvPicPr>
         <p:blipFill>
           <a:blip r:embed="rId2" cstate="print"/>
-          <a:srcRect l="4419" r="3970" b="6879"/>
+          <a:srcRect/>
           <a:stretch>
             <a:fillRect/>
           </a:stretch>
         </p:blipFill>
         <p:spPr bwMode="auto">
           <a:xfrm>
-            <a:off x="2012844" y="1463000"/>
-            <a:ext cx="5118313" cy="4846320"/>
+            <a:off x="1827754" y="1484784"/>
+            <a:ext cx="5488492" cy="5112568"/>
           </a:xfrm>
           <a:prstGeom prst="rect">
             <a:avLst/>
@@ -7251,6 +7408,35 @@
           <a:noFill/>
         </p:spPr>
       </p:pic>
+      <p:sp>
+        <p:nvSpPr>
+          <p:cNvPr id="9" name="Retângulo 8"/>
+          <p:cNvSpPr/>
+          <p:nvPr/>
+        </p:nvSpPr>
+        <p:spPr>
+          <a:xfrm>
+            <a:off x="304800" y="1700808"/>
+            <a:ext cx="4572000" cy="369332"/>
+          </a:xfrm>
+          <a:prstGeom prst="rect">
+            <a:avLst/>
+          </a:prstGeom>
+        </p:spPr>
+        <p:txBody>
+          <a:bodyPr>
+            <a:spAutoFit/>
+          </a:bodyPr>
+          <a:lstStyle/>
+          <a:p>
+            <a:r>
+              <a:rPr lang="pt-BR" dirty="0" smtClean="0"/>
+              <a:t>Telas Paciente</a:t>
+            </a:r>
+            <a:endParaRPr lang="pt-BR" dirty="0"/>
+          </a:p>
+        </p:txBody>
+      </p:sp>
     </p:spTree>
   </p:cSld>
   <p:clrMapOvr>
@@ -7375,11 +7561,7 @@
           <a:p>
             <a:r>
               <a:rPr lang="pt-BR" dirty="0" smtClean="0"/>
-              <a:t>IBTA </a:t>
-            </a:r>
-            <a:r>
-              <a:rPr lang="pt-BR" dirty="0" smtClean="0"/>
-              <a:t>Faculdades</a:t>
+              <a:t>IBTA Faculdades</a:t>
             </a:r>
           </a:p>
           <a:p>
@@ -7393,7 +7575,7 @@
       </p:sp>
       <p:pic>
         <p:nvPicPr>
-          <p:cNvPr id="12290" name="Picture 2" descr="C:\Users\'\Desktop\Projeto de baixa fidelidade\Projeto de baixa fidelidade\Paciente\Contato - Erro.png"/>
+          <p:cNvPr id="6146" name="Picture 2" descr="C:\Users\'\Desktop\Projeto de baixa fidelidade\Projeto de baixa fidelidade\Paciente\inicio - Erro.png"/>
           <p:cNvPicPr>
             <a:picLocks noChangeAspect="1" noChangeArrowheads="1"/>
           </p:cNvPicPr>
@@ -7401,15 +7583,15 @@
         </p:nvPicPr>
         <p:blipFill>
           <a:blip r:embed="rId2" cstate="print"/>
-          <a:srcRect/>
+          <a:srcRect l="4419" r="3970" b="6879"/>
           <a:stretch>
             <a:fillRect/>
           </a:stretch>
         </p:blipFill>
         <p:spPr bwMode="auto">
           <a:xfrm>
-            <a:off x="1827754" y="1484784"/>
-            <a:ext cx="5488492" cy="5112568"/>
+            <a:off x="2012844" y="1463000"/>
+            <a:ext cx="5118313" cy="4846320"/>
           </a:xfrm>
           <a:prstGeom prst="rect">
             <a:avLst/>
@@ -7417,6 +7599,35 @@
           <a:noFill/>
         </p:spPr>
       </p:pic>
+      <p:sp>
+        <p:nvSpPr>
+          <p:cNvPr id="9" name="Retângulo 8"/>
+          <p:cNvSpPr/>
+          <p:nvPr/>
+        </p:nvSpPr>
+        <p:spPr>
+          <a:xfrm>
+            <a:off x="304800" y="1700808"/>
+            <a:ext cx="4572000" cy="369332"/>
+          </a:xfrm>
+          <a:prstGeom prst="rect">
+            <a:avLst/>
+          </a:prstGeom>
+        </p:spPr>
+        <p:txBody>
+          <a:bodyPr>
+            <a:spAutoFit/>
+          </a:bodyPr>
+          <a:lstStyle/>
+          <a:p>
+            <a:r>
+              <a:rPr lang="pt-BR" dirty="0" smtClean="0"/>
+              <a:t>Telas Paciente</a:t>
+            </a:r>
+            <a:endParaRPr lang="pt-BR" dirty="0"/>
+          </a:p>
+        </p:txBody>
+      </p:sp>
     </p:spTree>
   </p:cSld>
   <p:clrMapOvr>
@@ -7541,17 +7752,42 @@
           <a:p>
             <a:r>
               <a:rPr lang="pt-BR" dirty="0" smtClean="0"/>
-              <a:t>IBTA </a:t>
-            </a:r>
-            <a:r>
-              <a:rPr lang="pt-BR" dirty="0" smtClean="0"/>
-              <a:t>Faculdades</a:t>
+              <a:t>IBTA Faculdades</a:t>
             </a:r>
           </a:p>
           <a:p>
             <a:r>
               <a:rPr lang="pt-BR" dirty="0" smtClean="0"/>
               <a:t>TCM/3ADS</a:t>
+            </a:r>
+            <a:endParaRPr lang="pt-BR" dirty="0"/>
+          </a:p>
+        </p:txBody>
+      </p:sp>
+      <p:sp>
+        <p:nvSpPr>
+          <p:cNvPr id="9" name="Retângulo 8"/>
+          <p:cNvSpPr/>
+          <p:nvPr/>
+        </p:nvSpPr>
+        <p:spPr>
+          <a:xfrm>
+            <a:off x="425624" y="1700808"/>
+            <a:ext cx="4572000" cy="369332"/>
+          </a:xfrm>
+          <a:prstGeom prst="rect">
+            <a:avLst/>
+          </a:prstGeom>
+        </p:spPr>
+        <p:txBody>
+          <a:bodyPr>
+            <a:spAutoFit/>
+          </a:bodyPr>
+          <a:lstStyle/>
+          <a:p>
+            <a:r>
+              <a:rPr lang="pt-BR" dirty="0" smtClean="0"/>
+              <a:t>Telas Gestor</a:t>
             </a:r>
             <a:endParaRPr lang="pt-BR" dirty="0"/>
           </a:p>
@@ -7559,31 +7795,40 @@
       </p:sp>
       <p:pic>
         <p:nvPicPr>
-          <p:cNvPr id="13315" name="Picture 3" descr="C:\Users\'\Desktop\Projeto de baixa fidelidade\Projeto de baixa fidelidade\Gestor\inicio.png"/>
+          <p:cNvPr id="2" name="Imagem 1"/>
           <p:cNvPicPr>
-            <a:picLocks noChangeAspect="1" noChangeArrowheads="1"/>
+            <a:picLocks noChangeAspect="1"/>
           </p:cNvPicPr>
           <p:nvPr/>
         </p:nvPicPr>
         <p:blipFill>
-          <a:blip r:embed="rId2" cstate="print"/>
-          <a:srcRect/>
+          <a:blip r:embed="rId2">
+            <a:extLst>
+              <a:ext uri="{28A0092B-C50C-407E-A947-70E740481C1C}">
+                <a14:useLocalDpi xmlns:a14="http://schemas.microsoft.com/office/drawing/2010/main" val="0"/>
+              </a:ext>
+            </a:extLst>
+          </a:blip>
           <a:stretch>
             <a:fillRect/>
           </a:stretch>
         </p:blipFill>
-        <p:spPr bwMode="auto">
+        <p:spPr>
           <a:xfrm>
-            <a:off x="1783130" y="1426493"/>
-            <a:ext cx="5577741" cy="5195705"/>
+            <a:off x="1773953" y="1456560"/>
+            <a:ext cx="5596094" cy="5212800"/>
           </a:xfrm>
           <a:prstGeom prst="rect">
             <a:avLst/>
           </a:prstGeom>
-          <a:noFill/>
         </p:spPr>
       </p:pic>
     </p:spTree>
+    <p:extLst>
+      <p:ext uri="{BB962C8B-B14F-4D97-AF65-F5344CB8AC3E}">
+        <p14:creationId xmlns:p14="http://schemas.microsoft.com/office/powerpoint/2010/main" val="3824886614"/>
+      </p:ext>
+    </p:extLst>
   </p:cSld>
   <p:clrMapOvr>
     <a:masterClrMapping/>
@@ -7707,17 +7952,42 @@
           <a:p>
             <a:r>
               <a:rPr lang="pt-BR" dirty="0" smtClean="0"/>
-              <a:t>IBTA </a:t>
-            </a:r>
-            <a:r>
-              <a:rPr lang="pt-BR" dirty="0" smtClean="0"/>
-              <a:t>Faculdades</a:t>
+              <a:t>IBTA Faculdades</a:t>
             </a:r>
           </a:p>
           <a:p>
             <a:r>
               <a:rPr lang="pt-BR" dirty="0" smtClean="0"/>
               <a:t>TCM/3ADS</a:t>
+            </a:r>
+            <a:endParaRPr lang="pt-BR" dirty="0"/>
+          </a:p>
+        </p:txBody>
+      </p:sp>
+      <p:sp>
+        <p:nvSpPr>
+          <p:cNvPr id="9" name="Retângulo 8"/>
+          <p:cNvSpPr/>
+          <p:nvPr/>
+        </p:nvSpPr>
+        <p:spPr>
+          <a:xfrm>
+            <a:off x="425624" y="1700808"/>
+            <a:ext cx="4572000" cy="369332"/>
+          </a:xfrm>
+          <a:prstGeom prst="rect">
+            <a:avLst/>
+          </a:prstGeom>
+        </p:spPr>
+        <p:txBody>
+          <a:bodyPr>
+            <a:spAutoFit/>
+          </a:bodyPr>
+          <a:lstStyle/>
+          <a:p>
+            <a:r>
+              <a:rPr lang="pt-BR" dirty="0" smtClean="0"/>
+              <a:t>Telas Gestor</a:t>
             </a:r>
             <a:endParaRPr lang="pt-BR" dirty="0"/>
           </a:p>
@@ -7725,31 +7995,40 @@
       </p:sp>
       <p:pic>
         <p:nvPicPr>
-          <p:cNvPr id="14338" name="Picture 2" descr="C:\Users\'\Desktop\Projeto de baixa fidelidade\Projeto de baixa fidelidade\Gestor\Cadastrar Paciente.png"/>
+          <p:cNvPr id="3" name="Imagem 2"/>
           <p:cNvPicPr>
-            <a:picLocks noChangeAspect="1" noChangeArrowheads="1"/>
+            <a:picLocks noChangeAspect="1"/>
           </p:cNvPicPr>
           <p:nvPr/>
         </p:nvPicPr>
         <p:blipFill>
-          <a:blip r:embed="rId2" cstate="print"/>
-          <a:srcRect/>
+          <a:blip r:embed="rId2">
+            <a:extLst>
+              <a:ext uri="{28A0092B-C50C-407E-A947-70E740481C1C}">
+                <a14:useLocalDpi xmlns:a14="http://schemas.microsoft.com/office/drawing/2010/main" val="0"/>
+              </a:ext>
+            </a:extLst>
+          </a:blip>
           <a:stretch>
             <a:fillRect/>
           </a:stretch>
         </p:blipFill>
-        <p:spPr bwMode="auto">
+        <p:spPr>
           <a:xfrm>
-            <a:off x="1750451" y="1412776"/>
-            <a:ext cx="5643098" cy="5256584"/>
+            <a:off x="1773953" y="1456560"/>
+            <a:ext cx="5596094" cy="5212800"/>
           </a:xfrm>
           <a:prstGeom prst="rect">
             <a:avLst/>
           </a:prstGeom>
-          <a:noFill/>
         </p:spPr>
       </p:pic>
     </p:spTree>
+    <p:extLst>
+      <p:ext uri="{BB962C8B-B14F-4D97-AF65-F5344CB8AC3E}">
+        <p14:creationId xmlns:p14="http://schemas.microsoft.com/office/powerpoint/2010/main" val="794704807"/>
+      </p:ext>
+    </p:extLst>
   </p:cSld>
   <p:clrMapOvr>
     <a:masterClrMapping/>
@@ -7873,17 +8152,42 @@
           <a:p>
             <a:r>
               <a:rPr lang="pt-BR" dirty="0" smtClean="0"/>
-              <a:t>IBTA </a:t>
-            </a:r>
-            <a:r>
-              <a:rPr lang="pt-BR" dirty="0" smtClean="0"/>
-              <a:t>Faculdades</a:t>
+              <a:t>IBTA Faculdades</a:t>
             </a:r>
           </a:p>
           <a:p>
             <a:r>
               <a:rPr lang="pt-BR" dirty="0" smtClean="0"/>
               <a:t>TCM/3ADS</a:t>
+            </a:r>
+            <a:endParaRPr lang="pt-BR" dirty="0"/>
+          </a:p>
+        </p:txBody>
+      </p:sp>
+      <p:sp>
+        <p:nvSpPr>
+          <p:cNvPr id="9" name="Retângulo 8"/>
+          <p:cNvSpPr/>
+          <p:nvPr/>
+        </p:nvSpPr>
+        <p:spPr>
+          <a:xfrm>
+            <a:off x="425624" y="1700808"/>
+            <a:ext cx="4572000" cy="369332"/>
+          </a:xfrm>
+          <a:prstGeom prst="rect">
+            <a:avLst/>
+          </a:prstGeom>
+        </p:spPr>
+        <p:txBody>
+          <a:bodyPr>
+            <a:spAutoFit/>
+          </a:bodyPr>
+          <a:lstStyle/>
+          <a:p>
+            <a:r>
+              <a:rPr lang="pt-BR" dirty="0" smtClean="0"/>
+              <a:t>Telas Gestor</a:t>
             </a:r>
             <a:endParaRPr lang="pt-BR" dirty="0"/>
           </a:p>
@@ -7891,31 +8195,40 @@
       </p:sp>
       <p:pic>
         <p:nvPicPr>
-          <p:cNvPr id="15362" name="Picture 2" descr="C:\Users\'\Desktop\Projeto de baixa fidelidade\Projeto de baixa fidelidade\Gestor\Cadastrar Paciente - Erro.png"/>
+          <p:cNvPr id="2" name="Imagem 1"/>
           <p:cNvPicPr>
-            <a:picLocks noChangeAspect="1" noChangeArrowheads="1"/>
+            <a:picLocks noChangeAspect="1"/>
           </p:cNvPicPr>
           <p:nvPr/>
         </p:nvPicPr>
         <p:blipFill>
-          <a:blip r:embed="rId2" cstate="print"/>
-          <a:srcRect/>
+          <a:blip r:embed="rId2">
+            <a:extLst>
+              <a:ext uri="{28A0092B-C50C-407E-A947-70E740481C1C}">
+                <a14:useLocalDpi xmlns:a14="http://schemas.microsoft.com/office/drawing/2010/main" val="0"/>
+              </a:ext>
+            </a:extLst>
+          </a:blip>
           <a:stretch>
             <a:fillRect/>
           </a:stretch>
         </p:blipFill>
-        <p:spPr bwMode="auto">
+        <p:spPr>
           <a:xfrm>
-            <a:off x="1783165" y="1454671"/>
-            <a:ext cx="5577671" cy="5195639"/>
+            <a:off x="1773953" y="1456560"/>
+            <a:ext cx="5596094" cy="5212800"/>
           </a:xfrm>
           <a:prstGeom prst="rect">
             <a:avLst/>
           </a:prstGeom>
-          <a:noFill/>
         </p:spPr>
       </p:pic>
     </p:spTree>
+    <p:extLst>
+      <p:ext uri="{BB962C8B-B14F-4D97-AF65-F5344CB8AC3E}">
+        <p14:creationId xmlns:p14="http://schemas.microsoft.com/office/powerpoint/2010/main" val="223346400"/>
+      </p:ext>
+    </p:extLst>
   </p:cSld>
   <p:clrMapOvr>
     <a:masterClrMapping/>
@@ -8039,17 +8352,42 @@
           <a:p>
             <a:r>
               <a:rPr lang="pt-BR" dirty="0" smtClean="0"/>
-              <a:t>IBTA </a:t>
-            </a:r>
-            <a:r>
-              <a:rPr lang="pt-BR" dirty="0" smtClean="0"/>
-              <a:t>Faculdades</a:t>
+              <a:t>IBTA Faculdades</a:t>
             </a:r>
           </a:p>
           <a:p>
             <a:r>
               <a:rPr lang="pt-BR" dirty="0" smtClean="0"/>
               <a:t>TCM/3ADS</a:t>
+            </a:r>
+            <a:endParaRPr lang="pt-BR" dirty="0"/>
+          </a:p>
+        </p:txBody>
+      </p:sp>
+      <p:sp>
+        <p:nvSpPr>
+          <p:cNvPr id="9" name="Retângulo 8"/>
+          <p:cNvSpPr/>
+          <p:nvPr/>
+        </p:nvSpPr>
+        <p:spPr>
+          <a:xfrm>
+            <a:off x="425624" y="1700808"/>
+            <a:ext cx="4572000" cy="369332"/>
+          </a:xfrm>
+          <a:prstGeom prst="rect">
+            <a:avLst/>
+          </a:prstGeom>
+        </p:spPr>
+        <p:txBody>
+          <a:bodyPr>
+            <a:spAutoFit/>
+          </a:bodyPr>
+          <a:lstStyle/>
+          <a:p>
+            <a:r>
+              <a:rPr lang="pt-BR" dirty="0" smtClean="0"/>
+              <a:t>Telas Gestor</a:t>
             </a:r>
             <a:endParaRPr lang="pt-BR" dirty="0"/>
           </a:p>
@@ -8057,31 +8395,40 @@
       </p:sp>
       <p:pic>
         <p:nvPicPr>
-          <p:cNvPr id="16386" name="Picture 2" descr="C:\Users\'\Desktop\Projeto de baixa fidelidade\Projeto de baixa fidelidade\Gestor\Pacientes Cadastrados.png"/>
+          <p:cNvPr id="3" name="Imagem 2"/>
           <p:cNvPicPr>
-            <a:picLocks noChangeAspect="1" noChangeArrowheads="1"/>
+            <a:picLocks noChangeAspect="1"/>
           </p:cNvPicPr>
           <p:nvPr/>
         </p:nvPicPr>
         <p:blipFill>
-          <a:blip r:embed="rId2" cstate="print"/>
-          <a:srcRect/>
+          <a:blip r:embed="rId2">
+            <a:extLst>
+              <a:ext uri="{28A0092B-C50C-407E-A947-70E740481C1C}">
+                <a14:useLocalDpi xmlns:a14="http://schemas.microsoft.com/office/drawing/2010/main" val="0"/>
+              </a:ext>
+            </a:extLst>
+          </a:blip>
           <a:stretch>
             <a:fillRect/>
           </a:stretch>
         </p:blipFill>
-        <p:spPr bwMode="auto">
+        <p:spPr>
           <a:xfrm>
-            <a:off x="1789103" y="1441351"/>
-            <a:ext cx="5565795" cy="5184576"/>
+            <a:off x="1773953" y="1456560"/>
+            <a:ext cx="5596094" cy="5212800"/>
           </a:xfrm>
           <a:prstGeom prst="rect">
             <a:avLst/>
           </a:prstGeom>
-          <a:noFill/>
         </p:spPr>
       </p:pic>
     </p:spTree>
+    <p:extLst>
+      <p:ext uri="{BB962C8B-B14F-4D97-AF65-F5344CB8AC3E}">
+        <p14:creationId xmlns:p14="http://schemas.microsoft.com/office/powerpoint/2010/main" val="39873967"/>
+      </p:ext>
+    </p:extLst>
   </p:cSld>
   <p:clrMapOvr>
     <a:masterClrMapping/>
@@ -8205,17 +8552,42 @@
           <a:p>
             <a:r>
               <a:rPr lang="pt-BR" dirty="0" smtClean="0"/>
-              <a:t>IBTA </a:t>
-            </a:r>
-            <a:r>
-              <a:rPr lang="pt-BR" dirty="0" smtClean="0"/>
-              <a:t>Faculdades</a:t>
+              <a:t>IBTA Faculdades</a:t>
             </a:r>
           </a:p>
           <a:p>
             <a:r>
               <a:rPr lang="pt-BR" dirty="0" smtClean="0"/>
               <a:t>TCM/3ADS</a:t>
+            </a:r>
+            <a:endParaRPr lang="pt-BR" dirty="0"/>
+          </a:p>
+        </p:txBody>
+      </p:sp>
+      <p:sp>
+        <p:nvSpPr>
+          <p:cNvPr id="9" name="Retângulo 8"/>
+          <p:cNvSpPr/>
+          <p:nvPr/>
+        </p:nvSpPr>
+        <p:spPr>
+          <a:xfrm>
+            <a:off x="425624" y="1700808"/>
+            <a:ext cx="4572000" cy="369332"/>
+          </a:xfrm>
+          <a:prstGeom prst="rect">
+            <a:avLst/>
+          </a:prstGeom>
+        </p:spPr>
+        <p:txBody>
+          <a:bodyPr>
+            <a:spAutoFit/>
+          </a:bodyPr>
+          <a:lstStyle/>
+          <a:p>
+            <a:r>
+              <a:rPr lang="pt-BR" dirty="0" smtClean="0"/>
+              <a:t>Telas Gestor</a:t>
             </a:r>
             <a:endParaRPr lang="pt-BR" dirty="0"/>
           </a:p>
@@ -8223,31 +8595,40 @@
       </p:sp>
       <p:pic>
         <p:nvPicPr>
-          <p:cNvPr id="17410" name="Picture 2" descr="C:\Users\'\Desktop\Projeto de baixa fidelidade\Projeto de baixa fidelidade\Admistrador\inicio.png"/>
+          <p:cNvPr id="2" name="Imagem 1"/>
           <p:cNvPicPr>
-            <a:picLocks noChangeAspect="1" noChangeArrowheads="1"/>
+            <a:picLocks noChangeAspect="1"/>
           </p:cNvPicPr>
           <p:nvPr/>
         </p:nvPicPr>
         <p:blipFill>
-          <a:blip r:embed="rId2" cstate="print"/>
-          <a:srcRect/>
+          <a:blip r:embed="rId2">
+            <a:extLst>
+              <a:ext uri="{28A0092B-C50C-407E-A947-70E740481C1C}">
+                <a14:useLocalDpi xmlns:a14="http://schemas.microsoft.com/office/drawing/2010/main" val="0"/>
+              </a:ext>
+            </a:extLst>
+          </a:blip>
           <a:stretch>
             <a:fillRect/>
           </a:stretch>
         </p:blipFill>
-        <p:spPr bwMode="auto">
+        <p:spPr>
           <a:xfrm>
-            <a:off x="1789102" y="1412776"/>
-            <a:ext cx="5565796" cy="5184576"/>
+            <a:off x="1773953" y="1456560"/>
+            <a:ext cx="5596094" cy="5212800"/>
           </a:xfrm>
           <a:prstGeom prst="rect">
             <a:avLst/>
           </a:prstGeom>
-          <a:noFill/>
         </p:spPr>
       </p:pic>
     </p:spTree>
+    <p:extLst>
+      <p:ext uri="{BB962C8B-B14F-4D97-AF65-F5344CB8AC3E}">
+        <p14:creationId xmlns:p14="http://schemas.microsoft.com/office/powerpoint/2010/main" val="4240453318"/>
+      </p:ext>
+    </p:extLst>
   </p:cSld>
   <p:clrMapOvr>
     <a:masterClrMapping/>
@@ -8371,17 +8752,42 @@
           <a:p>
             <a:r>
               <a:rPr lang="pt-BR" dirty="0" smtClean="0"/>
-              <a:t>IBTA </a:t>
-            </a:r>
-            <a:r>
-              <a:rPr lang="pt-BR" dirty="0" smtClean="0"/>
-              <a:t>Faculdades</a:t>
+              <a:t>IBTA Faculdades</a:t>
             </a:r>
           </a:p>
           <a:p>
             <a:r>
               <a:rPr lang="pt-BR" dirty="0" smtClean="0"/>
               <a:t>TCM/3ADS</a:t>
+            </a:r>
+            <a:endParaRPr lang="pt-BR" dirty="0"/>
+          </a:p>
+        </p:txBody>
+      </p:sp>
+      <p:sp>
+        <p:nvSpPr>
+          <p:cNvPr id="9" name="Retângulo 8"/>
+          <p:cNvSpPr/>
+          <p:nvPr/>
+        </p:nvSpPr>
+        <p:spPr>
+          <a:xfrm>
+            <a:off x="425624" y="1700808"/>
+            <a:ext cx="4572000" cy="369332"/>
+          </a:xfrm>
+          <a:prstGeom prst="rect">
+            <a:avLst/>
+          </a:prstGeom>
+        </p:spPr>
+        <p:txBody>
+          <a:bodyPr>
+            <a:spAutoFit/>
+          </a:bodyPr>
+          <a:lstStyle/>
+          <a:p>
+            <a:r>
+              <a:rPr lang="pt-BR" dirty="0" smtClean="0"/>
+              <a:t>Telas Gestor</a:t>
             </a:r>
             <a:endParaRPr lang="pt-BR" dirty="0"/>
           </a:p>
@@ -8389,31 +8795,40 @@
       </p:sp>
       <p:pic>
         <p:nvPicPr>
-          <p:cNvPr id="18434" name="Picture 2" descr="C:\Users\'\Desktop\Projeto de baixa fidelidade\Projeto de baixa fidelidade\Admistrador\Cadastrar Gestor.png"/>
+          <p:cNvPr id="3" name="Imagem 2"/>
           <p:cNvPicPr>
-            <a:picLocks noChangeAspect="1" noChangeArrowheads="1"/>
+            <a:picLocks noChangeAspect="1"/>
           </p:cNvPicPr>
           <p:nvPr/>
         </p:nvPicPr>
         <p:blipFill>
-          <a:blip r:embed="rId2" cstate="print"/>
-          <a:srcRect/>
+          <a:blip r:embed="rId2">
+            <a:extLst>
+              <a:ext uri="{28A0092B-C50C-407E-A947-70E740481C1C}">
+                <a14:useLocalDpi xmlns:a14="http://schemas.microsoft.com/office/drawing/2010/main" val="0"/>
+              </a:ext>
+            </a:extLst>
+          </a:blip>
           <a:stretch>
             <a:fillRect/>
           </a:stretch>
         </p:blipFill>
-        <p:spPr bwMode="auto">
+        <p:spPr>
           <a:xfrm>
-            <a:off x="1827755" y="1484784"/>
-            <a:ext cx="5488491" cy="5112568"/>
+            <a:off x="1773953" y="1456560"/>
+            <a:ext cx="5596094" cy="5212800"/>
           </a:xfrm>
           <a:prstGeom prst="rect">
             <a:avLst/>
           </a:prstGeom>
-          <a:noFill/>
         </p:spPr>
       </p:pic>
     </p:spTree>
+    <p:extLst>
+      <p:ext uri="{BB962C8B-B14F-4D97-AF65-F5344CB8AC3E}">
+        <p14:creationId xmlns:p14="http://schemas.microsoft.com/office/powerpoint/2010/main" val="1620825544"/>
+      </p:ext>
+    </p:extLst>
   </p:cSld>
   <p:clrMapOvr>
     <a:masterClrMapping/>
@@ -8537,17 +8952,42 @@
           <a:p>
             <a:r>
               <a:rPr lang="pt-BR" dirty="0" smtClean="0"/>
-              <a:t>IBTA </a:t>
-            </a:r>
-            <a:r>
-              <a:rPr lang="pt-BR" dirty="0" smtClean="0"/>
-              <a:t>Faculdades</a:t>
+              <a:t>IBTA Faculdades</a:t>
             </a:r>
           </a:p>
           <a:p>
             <a:r>
               <a:rPr lang="pt-BR" dirty="0" smtClean="0"/>
               <a:t>TCM/3ADS</a:t>
+            </a:r>
+            <a:endParaRPr lang="pt-BR" dirty="0"/>
+          </a:p>
+        </p:txBody>
+      </p:sp>
+      <p:sp>
+        <p:nvSpPr>
+          <p:cNvPr id="9" name="Retângulo 8"/>
+          <p:cNvSpPr/>
+          <p:nvPr/>
+        </p:nvSpPr>
+        <p:spPr>
+          <a:xfrm>
+            <a:off x="425624" y="1700808"/>
+            <a:ext cx="4572000" cy="369332"/>
+          </a:xfrm>
+          <a:prstGeom prst="rect">
+            <a:avLst/>
+          </a:prstGeom>
+        </p:spPr>
+        <p:txBody>
+          <a:bodyPr>
+            <a:spAutoFit/>
+          </a:bodyPr>
+          <a:lstStyle/>
+          <a:p>
+            <a:r>
+              <a:rPr lang="pt-BR" dirty="0" smtClean="0"/>
+              <a:t>Telas Gestor</a:t>
             </a:r>
             <a:endParaRPr lang="pt-BR" dirty="0"/>
           </a:p>
@@ -8555,31 +8995,40 @@
       </p:sp>
       <p:pic>
         <p:nvPicPr>
-          <p:cNvPr id="2" name="Picture 2" descr="C:\Users\'\Desktop\Projeto de baixa fidelidade\Projeto de baixa fidelidade\Admistrador\Cadastrar Gestor - Erro.png"/>
+          <p:cNvPr id="2" name="Imagem 1"/>
           <p:cNvPicPr>
-            <a:picLocks noChangeAspect="1" noChangeArrowheads="1"/>
+            <a:picLocks noChangeAspect="1"/>
           </p:cNvPicPr>
           <p:nvPr/>
         </p:nvPicPr>
         <p:blipFill>
-          <a:blip r:embed="rId2" cstate="print"/>
-          <a:srcRect/>
+          <a:blip r:embed="rId2">
+            <a:extLst>
+              <a:ext uri="{28A0092B-C50C-407E-A947-70E740481C1C}">
+                <a14:useLocalDpi xmlns:a14="http://schemas.microsoft.com/office/drawing/2010/main" val="0"/>
+              </a:ext>
+            </a:extLst>
+          </a:blip>
           <a:stretch>
             <a:fillRect/>
           </a:stretch>
         </p:blipFill>
-        <p:spPr bwMode="auto">
+        <p:spPr>
           <a:xfrm>
-            <a:off x="1850855" y="1412378"/>
-            <a:ext cx="5566220" cy="5184973"/>
+            <a:off x="1773953" y="1456560"/>
+            <a:ext cx="5596094" cy="5212800"/>
           </a:xfrm>
           <a:prstGeom prst="rect">
             <a:avLst/>
           </a:prstGeom>
-          <a:noFill/>
         </p:spPr>
       </p:pic>
     </p:spTree>
+    <p:extLst>
+      <p:ext uri="{BB962C8B-B14F-4D97-AF65-F5344CB8AC3E}">
+        <p14:creationId xmlns:p14="http://schemas.microsoft.com/office/powerpoint/2010/main" val="3255699134"/>
+      </p:ext>
+    </p:extLst>
   </p:cSld>
   <p:clrMapOvr>
     <a:masterClrMapping/>
@@ -8703,17 +9152,42 @@
           <a:p>
             <a:r>
               <a:rPr lang="pt-BR" dirty="0" smtClean="0"/>
-              <a:t>IBTA </a:t>
-            </a:r>
-            <a:r>
-              <a:rPr lang="pt-BR" dirty="0" smtClean="0"/>
-              <a:t>Faculdades</a:t>
+              <a:t>IBTA Faculdades</a:t>
             </a:r>
           </a:p>
           <a:p>
             <a:r>
               <a:rPr lang="pt-BR" dirty="0" smtClean="0"/>
               <a:t>TCM/3ADS</a:t>
+            </a:r>
+            <a:endParaRPr lang="pt-BR" dirty="0"/>
+          </a:p>
+        </p:txBody>
+      </p:sp>
+      <p:sp>
+        <p:nvSpPr>
+          <p:cNvPr id="9" name="Retângulo 8"/>
+          <p:cNvSpPr/>
+          <p:nvPr/>
+        </p:nvSpPr>
+        <p:spPr>
+          <a:xfrm>
+            <a:off x="425624" y="1700808"/>
+            <a:ext cx="4572000" cy="369332"/>
+          </a:xfrm>
+          <a:prstGeom prst="rect">
+            <a:avLst/>
+          </a:prstGeom>
+        </p:spPr>
+        <p:txBody>
+          <a:bodyPr>
+            <a:spAutoFit/>
+          </a:bodyPr>
+          <a:lstStyle/>
+          <a:p>
+            <a:r>
+              <a:rPr lang="pt-BR" dirty="0" smtClean="0"/>
+              <a:t>Telas Gestor</a:t>
             </a:r>
             <a:endParaRPr lang="pt-BR" dirty="0"/>
           </a:p>
@@ -8721,31 +9195,40 @@
       </p:sp>
       <p:pic>
         <p:nvPicPr>
-          <p:cNvPr id="20482" name="Picture 2" descr="C:\Users\'\Desktop\Projeto de baixa fidelidade\Projeto de baixa fidelidade\Admistrador\Usuarios Cadastrados.png"/>
+          <p:cNvPr id="3" name="Imagem 2"/>
           <p:cNvPicPr>
-            <a:picLocks noChangeAspect="1" noChangeArrowheads="1"/>
+            <a:picLocks noChangeAspect="1"/>
           </p:cNvPicPr>
           <p:nvPr/>
         </p:nvPicPr>
         <p:blipFill>
-          <a:blip r:embed="rId2" cstate="print"/>
-          <a:srcRect/>
+          <a:blip r:embed="rId2">
+            <a:extLst>
+              <a:ext uri="{28A0092B-C50C-407E-A947-70E740481C1C}">
+                <a14:useLocalDpi xmlns:a14="http://schemas.microsoft.com/office/drawing/2010/main" val="0"/>
+              </a:ext>
+            </a:extLst>
+          </a:blip>
           <a:stretch>
             <a:fillRect/>
           </a:stretch>
         </p:blipFill>
-        <p:spPr bwMode="auto">
+        <p:spPr>
           <a:xfrm>
-            <a:off x="1790427" y="1465734"/>
-            <a:ext cx="5563147" cy="5182109"/>
+            <a:off x="1773953" y="1456560"/>
+            <a:ext cx="5596094" cy="5212800"/>
           </a:xfrm>
           <a:prstGeom prst="rect">
             <a:avLst/>
           </a:prstGeom>
-          <a:noFill/>
         </p:spPr>
       </p:pic>
     </p:spTree>
+    <p:extLst>
+      <p:ext uri="{BB962C8B-B14F-4D97-AF65-F5344CB8AC3E}">
+        <p14:creationId xmlns:p14="http://schemas.microsoft.com/office/powerpoint/2010/main" val="149236656"/>
+      </p:ext>
+    </p:extLst>
   </p:cSld>
   <p:clrMapOvr>
     <a:masterClrMapping/>
@@ -8820,15 +9303,7 @@
           <a:p>
             <a:r>
               <a:rPr lang="pt-BR" sz="2400" dirty="0" smtClean="0"/>
-              <a:t>Analisando outros sistemas e interfaces (web) de gerenciamento de exames pudemos constatar que existem muitas falhas </a:t>
-            </a:r>
-            <a:r>
-              <a:rPr lang="pt-BR" sz="2400" dirty="0" smtClean="0"/>
-              <a:t>e com resolvemos desenvolver um sistema que auxiliasse a resolução dessas falhas. O </a:t>
-            </a:r>
-            <a:r>
-              <a:rPr lang="pt-BR" sz="2400" dirty="0" smtClean="0"/>
-              <a:t>paciente poderá ter acesso ao sistema via </a:t>
+              <a:t>Analisando outros sistemas e interfaces (web) de gerenciamento de exames pudemos constatar que existem muitas falhas e com resolvemos desenvolver um sistema que auxiliasse a resolução dessas falhas. O paciente poderá ter acesso ao sistema via </a:t>
             </a:r>
             <a:r>
               <a:rPr lang="pt-BR" sz="2400" dirty="0" err="1" smtClean="0"/>
@@ -8836,19 +9311,7 @@
             </a:r>
             <a:r>
               <a:rPr lang="pt-BR" sz="2400" dirty="0" smtClean="0"/>
-              <a:t> </a:t>
-            </a:r>
-            <a:r>
-              <a:rPr lang="pt-BR" sz="2400" dirty="0" smtClean="0"/>
-              <a:t>para verificar </a:t>
-            </a:r>
-            <a:r>
-              <a:rPr lang="pt-BR" sz="2400" dirty="0" smtClean="0"/>
-              <a:t>o andamento e resultado de exames</a:t>
-            </a:r>
-            <a:r>
-              <a:rPr lang="pt-BR" sz="2400" dirty="0" smtClean="0"/>
-              <a:t>.</a:t>
+              <a:t> para verificar o andamento e resultado de exames.</a:t>
             </a:r>
           </a:p>
           <a:p>
@@ -9067,11 +9530,7 @@
           <a:p>
             <a:r>
               <a:rPr lang="pt-BR" dirty="0" smtClean="0"/>
-              <a:t>IBTA </a:t>
-            </a:r>
-            <a:r>
-              <a:rPr lang="pt-BR" dirty="0" smtClean="0"/>
-              <a:t>Faculdades</a:t>
+              <a:t>IBTA Faculdades</a:t>
             </a:r>
           </a:p>
           <a:p>
@@ -9085,30 +9544,63 @@
       </p:sp>
       <p:pic>
         <p:nvPicPr>
-          <p:cNvPr id="21506" name="Picture 2" descr="C:\Users\'\Desktop\Projeto de baixa fidelidade\Projeto de baixa fidelidade\inicio - Erro.png"/>
+          <p:cNvPr id="2" name="Imagem 1"/>
           <p:cNvPicPr>
-            <a:picLocks noChangeAspect="1" noChangeArrowheads="1"/>
+            <a:picLocks noChangeAspect="1"/>
           </p:cNvPicPr>
           <p:nvPr/>
         </p:nvPicPr>
         <p:blipFill>
-          <a:blip r:embed="rId2" cstate="print"/>
-          <a:srcRect/>
+          <a:blip r:embed="rId2">
+            <a:extLst>
+              <a:ext uri="{28A0092B-C50C-407E-A947-70E740481C1C}">
+                <a14:useLocalDpi xmlns:a14="http://schemas.microsoft.com/office/drawing/2010/main" val="0"/>
+              </a:ext>
+            </a:extLst>
+          </a:blip>
           <a:stretch>
             <a:fillRect/>
           </a:stretch>
         </p:blipFill>
-        <p:spPr bwMode="auto">
+        <p:spPr>
           <a:xfrm>
-            <a:off x="1756879" y="1416968"/>
-            <a:ext cx="5649293" cy="5262355"/>
+            <a:off x="1773953" y="1412776"/>
+            <a:ext cx="5596094" cy="5212800"/>
           </a:xfrm>
           <a:prstGeom prst="rect">
             <a:avLst/>
           </a:prstGeom>
-          <a:noFill/>
         </p:spPr>
       </p:pic>
+      <p:sp>
+        <p:nvSpPr>
+          <p:cNvPr id="9" name="Retângulo 8"/>
+          <p:cNvSpPr/>
+          <p:nvPr/>
+        </p:nvSpPr>
+        <p:spPr>
+          <a:xfrm>
+            <a:off x="288032" y="1700808"/>
+            <a:ext cx="4572000" cy="307777"/>
+          </a:xfrm>
+          <a:prstGeom prst="rect">
+            <a:avLst/>
+          </a:prstGeom>
+        </p:spPr>
+        <p:txBody>
+          <a:bodyPr>
+            <a:spAutoFit/>
+          </a:bodyPr>
+          <a:lstStyle/>
+          <a:p>
+            <a:r>
+              <a:rPr lang="pt-BR" sz="1400" dirty="0" smtClean="0"/>
+              <a:t>Telas Administrador</a:t>
+            </a:r>
+            <a:endParaRPr lang="pt-BR" sz="1400" dirty="0"/>
+          </a:p>
+        </p:txBody>
+      </p:sp>
     </p:spTree>
   </p:cSld>
   <p:clrMapOvr>
@@ -9161,68 +9653,9 @@
           <a:p>
             <a:r>
               <a:rPr lang="pt-BR" dirty="0" smtClean="0"/>
-              <a:t>Conclusão</a:t>
-            </a:r>
-            <a:endParaRPr lang="pt-BR" dirty="0"/>
-          </a:p>
-        </p:txBody>
-      </p:sp>
-      <p:sp>
-        <p:nvSpPr>
-          <p:cNvPr id="19459" name="Rectangle 3"/>
-          <p:cNvSpPr>
-            <a:spLocks noGrp="1" noChangeArrowheads="1"/>
-          </p:cNvSpPr>
-          <p:nvPr>
-            <p:ph type="body" idx="1"/>
-          </p:nvPr>
-        </p:nvSpPr>
-        <p:spPr/>
-        <p:txBody>
-          <a:bodyPr/>
-          <a:lstStyle/>
-          <a:p>
-            <a:r>
-              <a:rPr lang="pt-BR" sz="2400" dirty="0" smtClean="0"/>
-              <a:t>O ponto principal do sistema é a possibilidade de controle e gestão que ele oferece para a clínica, além de facilidade para o paciente que for realizar um exame.</a:t>
-            </a:r>
-          </a:p>
-          <a:p>
-            <a:r>
-              <a:rPr lang="pt-BR" sz="2400" dirty="0" smtClean="0"/>
-              <a:t>Um ponto a ser melhorado no sistema é a quantidade pequena de funcionalidades dele.</a:t>
-            </a:r>
-          </a:p>
-          <a:p>
-            <a:r>
-              <a:rPr lang="pt-BR" sz="2400" dirty="0" smtClean="0"/>
-              <a:t>No futuro poderá ser acrescentado um sistema de agendamento de exames online no </a:t>
-            </a:r>
-            <a:r>
-              <a:rPr lang="pt-BR" sz="2400" dirty="0" err="1" smtClean="0"/>
-              <a:t>website</a:t>
-            </a:r>
-            <a:r>
-              <a:rPr lang="pt-BR" sz="2400" dirty="0" smtClean="0"/>
-              <a:t> da clínica e o ajuste do </a:t>
-            </a:r>
-            <a:r>
-              <a:rPr lang="pt-BR" sz="2400" dirty="0" err="1" smtClean="0"/>
-              <a:t>website</a:t>
-            </a:r>
-            <a:r>
-              <a:rPr lang="pt-BR" sz="2400" dirty="0" smtClean="0"/>
-              <a:t> para dispositivos </a:t>
-            </a:r>
-            <a:r>
-              <a:rPr lang="pt-BR" sz="2400" dirty="0" err="1" smtClean="0"/>
-              <a:t>mobile</a:t>
-            </a:r>
-            <a:r>
-              <a:rPr lang="pt-BR" sz="2400" dirty="0" smtClean="0"/>
-              <a:t>.</a:t>
-            </a:r>
-            <a:endParaRPr lang="pt-BR" sz="2400" dirty="0"/>
+              <a:t>Protótipo de Baixa Fidelidade</a:t>
+            </a:r>
+            <a:endParaRPr lang="pt-BR" dirty="0"/>
           </a:p>
         </p:txBody>
       </p:sp>
@@ -9292,11 +9725,7 @@
           <a:p>
             <a:r>
               <a:rPr lang="pt-BR" dirty="0" smtClean="0"/>
-              <a:t>IBTA</a:t>
-            </a:r>
-            <a:r>
-              <a:rPr lang="pt-BR" dirty="0" smtClean="0"/>
-              <a:t> Faculdades</a:t>
+              <a:t>IBTA Faculdades</a:t>
             </a:r>
           </a:p>
           <a:p>
@@ -9305,6 +9734,1630 @@
               <a:t>TCM/3ADS</a:t>
             </a:r>
             <a:endParaRPr lang="pt-BR" dirty="0"/>
+          </a:p>
+        </p:txBody>
+      </p:sp>
+      <p:pic>
+        <p:nvPicPr>
+          <p:cNvPr id="2" name="Imagem 1"/>
+          <p:cNvPicPr>
+            <a:picLocks noChangeAspect="1"/>
+          </p:cNvPicPr>
+          <p:nvPr/>
+        </p:nvPicPr>
+        <p:blipFill>
+          <a:blip r:embed="rId2">
+            <a:extLst>
+              <a:ext uri="{28A0092B-C50C-407E-A947-70E740481C1C}">
+                <a14:useLocalDpi xmlns:a14="http://schemas.microsoft.com/office/drawing/2010/main" val="0"/>
+              </a:ext>
+            </a:extLst>
+          </a:blip>
+          <a:stretch>
+            <a:fillRect/>
+          </a:stretch>
+        </p:blipFill>
+        <p:spPr>
+          <a:xfrm>
+            <a:off x="1773953" y="1456560"/>
+            <a:ext cx="5596094" cy="5212800"/>
+          </a:xfrm>
+          <a:prstGeom prst="rect">
+            <a:avLst/>
+          </a:prstGeom>
+        </p:spPr>
+      </p:pic>
+      <p:sp>
+        <p:nvSpPr>
+          <p:cNvPr id="9" name="Retângulo 8"/>
+          <p:cNvSpPr/>
+          <p:nvPr/>
+        </p:nvSpPr>
+        <p:spPr>
+          <a:xfrm>
+            <a:off x="288032" y="1700808"/>
+            <a:ext cx="4572000" cy="307777"/>
+          </a:xfrm>
+          <a:prstGeom prst="rect">
+            <a:avLst/>
+          </a:prstGeom>
+        </p:spPr>
+        <p:txBody>
+          <a:bodyPr>
+            <a:spAutoFit/>
+          </a:bodyPr>
+          <a:lstStyle/>
+          <a:p>
+            <a:r>
+              <a:rPr lang="pt-BR" sz="1400" dirty="0" smtClean="0"/>
+              <a:t>Telas Administrador</a:t>
+            </a:r>
+            <a:endParaRPr lang="pt-BR" sz="1400" dirty="0"/>
+          </a:p>
+        </p:txBody>
+      </p:sp>
+    </p:spTree>
+  </p:cSld>
+  <p:clrMapOvr>
+    <a:masterClrMapping/>
+  </p:clrMapOvr>
+  <p:transition spd="med">
+    <p:fade/>
+  </p:transition>
+  <p:timing>
+    <p:tnLst>
+      <p:par>
+        <p:cTn id="1" dur="indefinite" restart="never" nodeType="tmRoot"/>
+      </p:par>
+    </p:tnLst>
+  </p:timing>
+</p:sld>
+</file>
+
+<file path=ppt/slides/slide32.xml><?xml version="1.0" encoding="utf-8"?>
+<p:sld xmlns:a="http://schemas.openxmlformats.org/drawingml/2006/main" xmlns:r="http://schemas.openxmlformats.org/officeDocument/2006/relationships" xmlns:p="http://schemas.openxmlformats.org/presentationml/2006/main">
+  <p:cSld>
+    <p:spTree>
+      <p:nvGrpSpPr>
+        <p:cNvPr id="1" name=""/>
+        <p:cNvGrpSpPr/>
+        <p:nvPr/>
+      </p:nvGrpSpPr>
+      <p:grpSpPr>
+        <a:xfrm>
+          <a:off x="0" y="0"/>
+          <a:ext cx="0" cy="0"/>
+          <a:chOff x="0" y="0"/>
+          <a:chExt cx="0" cy="0"/>
+        </a:xfrm>
+      </p:grpSpPr>
+      <p:sp>
+        <p:nvSpPr>
+          <p:cNvPr id="19458" name="Rectangle 2"/>
+          <p:cNvSpPr>
+            <a:spLocks noGrp="1" noChangeArrowheads="1"/>
+          </p:cNvSpPr>
+          <p:nvPr>
+            <p:ph type="title"/>
+          </p:nvPr>
+        </p:nvSpPr>
+        <p:spPr/>
+        <p:txBody>
+          <a:bodyPr/>
+          <a:lstStyle/>
+          <a:p>
+            <a:r>
+              <a:rPr lang="pt-BR" dirty="0" smtClean="0"/>
+              <a:t>Protótipo de Baixa Fidelidade</a:t>
+            </a:r>
+            <a:endParaRPr lang="pt-BR" dirty="0"/>
+          </a:p>
+        </p:txBody>
+      </p:sp>
+      <p:sp>
+        <p:nvSpPr>
+          <p:cNvPr id="6" name="Espaço Reservado para Data 5"/>
+          <p:cNvSpPr>
+            <a:spLocks noGrp="1"/>
+          </p:cNvSpPr>
+          <p:nvPr>
+            <p:ph type="dt" sz="half" idx="10"/>
+          </p:nvPr>
+        </p:nvSpPr>
+        <p:spPr/>
+        <p:txBody>
+          <a:bodyPr/>
+          <a:lstStyle/>
+          <a:p>
+            <a:r>
+              <a:rPr lang="pt-BR" dirty="0" smtClean="0"/>
+              <a:t>22/09/2014</a:t>
+            </a:r>
+          </a:p>
+          <a:p>
+            <a:endParaRPr lang="pt-BR" dirty="0"/>
+          </a:p>
+        </p:txBody>
+      </p:sp>
+      <p:sp>
+        <p:nvSpPr>
+          <p:cNvPr id="7" name="Espaço Reservado para Número de Slide 6"/>
+          <p:cNvSpPr>
+            <a:spLocks noGrp="1"/>
+          </p:cNvSpPr>
+          <p:nvPr>
+            <p:ph type="sldNum" sz="quarter" idx="12"/>
+          </p:nvPr>
+        </p:nvSpPr>
+        <p:spPr/>
+        <p:txBody>
+          <a:bodyPr/>
+          <a:lstStyle/>
+          <a:p>
+            <a:fld id="{516476CB-12D4-456A-BCEE-8469A8C40045}" type="slidenum">
+              <a:rPr lang="pt-BR" smtClean="0"/>
+              <a:pPr/>
+              <a:t>32</a:t>
+            </a:fld>
+            <a:endParaRPr lang="pt-BR" dirty="0"/>
+          </a:p>
+        </p:txBody>
+      </p:sp>
+      <p:sp>
+        <p:nvSpPr>
+          <p:cNvPr id="8" name="Espaço Reservado para Rodapé 7"/>
+          <p:cNvSpPr>
+            <a:spLocks noGrp="1"/>
+          </p:cNvSpPr>
+          <p:nvPr>
+            <p:ph type="ftr" sz="quarter" idx="11"/>
+          </p:nvPr>
+        </p:nvSpPr>
+        <p:spPr/>
+        <p:txBody>
+          <a:bodyPr/>
+          <a:lstStyle/>
+          <a:p>
+            <a:r>
+              <a:rPr lang="pt-BR" dirty="0" smtClean="0"/>
+              <a:t>IBTA Faculdades</a:t>
+            </a:r>
+          </a:p>
+          <a:p>
+            <a:r>
+              <a:rPr lang="pt-BR" dirty="0" smtClean="0"/>
+              <a:t>TCM/3ADS</a:t>
+            </a:r>
+            <a:endParaRPr lang="pt-BR" dirty="0"/>
+          </a:p>
+        </p:txBody>
+      </p:sp>
+      <p:pic>
+        <p:nvPicPr>
+          <p:cNvPr id="2" name="Imagem 1"/>
+          <p:cNvPicPr>
+            <a:picLocks noChangeAspect="1"/>
+          </p:cNvPicPr>
+          <p:nvPr/>
+        </p:nvPicPr>
+        <p:blipFill>
+          <a:blip r:embed="rId2">
+            <a:extLst>
+              <a:ext uri="{28A0092B-C50C-407E-A947-70E740481C1C}">
+                <a14:useLocalDpi xmlns:a14="http://schemas.microsoft.com/office/drawing/2010/main" val="0"/>
+              </a:ext>
+            </a:extLst>
+          </a:blip>
+          <a:stretch>
+            <a:fillRect/>
+          </a:stretch>
+        </p:blipFill>
+        <p:spPr>
+          <a:xfrm>
+            <a:off x="1773953" y="1456560"/>
+            <a:ext cx="5596094" cy="5212800"/>
+          </a:xfrm>
+          <a:prstGeom prst="rect">
+            <a:avLst/>
+          </a:prstGeom>
+        </p:spPr>
+      </p:pic>
+      <p:sp>
+        <p:nvSpPr>
+          <p:cNvPr id="9" name="Retângulo 8"/>
+          <p:cNvSpPr/>
+          <p:nvPr/>
+        </p:nvSpPr>
+        <p:spPr>
+          <a:xfrm>
+            <a:off x="288032" y="1700808"/>
+            <a:ext cx="4572000" cy="307777"/>
+          </a:xfrm>
+          <a:prstGeom prst="rect">
+            <a:avLst/>
+          </a:prstGeom>
+        </p:spPr>
+        <p:txBody>
+          <a:bodyPr>
+            <a:spAutoFit/>
+          </a:bodyPr>
+          <a:lstStyle/>
+          <a:p>
+            <a:r>
+              <a:rPr lang="pt-BR" sz="1400" dirty="0" smtClean="0"/>
+              <a:t>Telas Administrador</a:t>
+            </a:r>
+            <a:endParaRPr lang="pt-BR" sz="1400" dirty="0"/>
+          </a:p>
+        </p:txBody>
+      </p:sp>
+    </p:spTree>
+  </p:cSld>
+  <p:clrMapOvr>
+    <a:masterClrMapping/>
+  </p:clrMapOvr>
+  <p:transition spd="med">
+    <p:fade/>
+  </p:transition>
+  <p:timing>
+    <p:tnLst>
+      <p:par>
+        <p:cTn id="1" dur="indefinite" restart="never" nodeType="tmRoot"/>
+      </p:par>
+    </p:tnLst>
+  </p:timing>
+</p:sld>
+</file>
+
+<file path=ppt/slides/slide33.xml><?xml version="1.0" encoding="utf-8"?>
+<p:sld xmlns:a="http://schemas.openxmlformats.org/drawingml/2006/main" xmlns:r="http://schemas.openxmlformats.org/officeDocument/2006/relationships" xmlns:p="http://schemas.openxmlformats.org/presentationml/2006/main">
+  <p:cSld>
+    <p:spTree>
+      <p:nvGrpSpPr>
+        <p:cNvPr id="1" name=""/>
+        <p:cNvGrpSpPr/>
+        <p:nvPr/>
+      </p:nvGrpSpPr>
+      <p:grpSpPr>
+        <a:xfrm>
+          <a:off x="0" y="0"/>
+          <a:ext cx="0" cy="0"/>
+          <a:chOff x="0" y="0"/>
+          <a:chExt cx="0" cy="0"/>
+        </a:xfrm>
+      </p:grpSpPr>
+      <p:sp>
+        <p:nvSpPr>
+          <p:cNvPr id="19458" name="Rectangle 2"/>
+          <p:cNvSpPr>
+            <a:spLocks noGrp="1" noChangeArrowheads="1"/>
+          </p:cNvSpPr>
+          <p:nvPr>
+            <p:ph type="title"/>
+          </p:nvPr>
+        </p:nvSpPr>
+        <p:spPr/>
+        <p:txBody>
+          <a:bodyPr/>
+          <a:lstStyle/>
+          <a:p>
+            <a:r>
+              <a:rPr lang="pt-BR" dirty="0" smtClean="0"/>
+              <a:t>Protótipo de Baixa Fidelidade</a:t>
+            </a:r>
+            <a:endParaRPr lang="pt-BR" dirty="0"/>
+          </a:p>
+        </p:txBody>
+      </p:sp>
+      <p:sp>
+        <p:nvSpPr>
+          <p:cNvPr id="6" name="Espaço Reservado para Data 5"/>
+          <p:cNvSpPr>
+            <a:spLocks noGrp="1"/>
+          </p:cNvSpPr>
+          <p:nvPr>
+            <p:ph type="dt" sz="half" idx="10"/>
+          </p:nvPr>
+        </p:nvSpPr>
+        <p:spPr/>
+        <p:txBody>
+          <a:bodyPr/>
+          <a:lstStyle/>
+          <a:p>
+            <a:r>
+              <a:rPr lang="pt-BR" dirty="0" smtClean="0"/>
+              <a:t>22/09/2014</a:t>
+            </a:r>
+          </a:p>
+          <a:p>
+            <a:endParaRPr lang="pt-BR" dirty="0"/>
+          </a:p>
+        </p:txBody>
+      </p:sp>
+      <p:sp>
+        <p:nvSpPr>
+          <p:cNvPr id="7" name="Espaço Reservado para Número de Slide 6"/>
+          <p:cNvSpPr>
+            <a:spLocks noGrp="1"/>
+          </p:cNvSpPr>
+          <p:nvPr>
+            <p:ph type="sldNum" sz="quarter" idx="12"/>
+          </p:nvPr>
+        </p:nvSpPr>
+        <p:spPr/>
+        <p:txBody>
+          <a:bodyPr/>
+          <a:lstStyle/>
+          <a:p>
+            <a:fld id="{516476CB-12D4-456A-BCEE-8469A8C40045}" type="slidenum">
+              <a:rPr lang="pt-BR" smtClean="0"/>
+              <a:pPr/>
+              <a:t>33</a:t>
+            </a:fld>
+            <a:endParaRPr lang="pt-BR" dirty="0"/>
+          </a:p>
+        </p:txBody>
+      </p:sp>
+      <p:sp>
+        <p:nvSpPr>
+          <p:cNvPr id="8" name="Espaço Reservado para Rodapé 7"/>
+          <p:cNvSpPr>
+            <a:spLocks noGrp="1"/>
+          </p:cNvSpPr>
+          <p:nvPr>
+            <p:ph type="ftr" sz="quarter" idx="11"/>
+          </p:nvPr>
+        </p:nvSpPr>
+        <p:spPr/>
+        <p:txBody>
+          <a:bodyPr/>
+          <a:lstStyle/>
+          <a:p>
+            <a:r>
+              <a:rPr lang="pt-BR" dirty="0" smtClean="0"/>
+              <a:t>IBTA Faculdades</a:t>
+            </a:r>
+          </a:p>
+          <a:p>
+            <a:r>
+              <a:rPr lang="pt-BR" dirty="0" smtClean="0"/>
+              <a:t>TCM/3ADS</a:t>
+            </a:r>
+            <a:endParaRPr lang="pt-BR" dirty="0"/>
+          </a:p>
+        </p:txBody>
+      </p:sp>
+      <p:pic>
+        <p:nvPicPr>
+          <p:cNvPr id="2" name="Imagem 1"/>
+          <p:cNvPicPr>
+            <a:picLocks noChangeAspect="1"/>
+          </p:cNvPicPr>
+          <p:nvPr/>
+        </p:nvPicPr>
+        <p:blipFill>
+          <a:blip r:embed="rId2">
+            <a:extLst>
+              <a:ext uri="{28A0092B-C50C-407E-A947-70E740481C1C}">
+                <a14:useLocalDpi xmlns:a14="http://schemas.microsoft.com/office/drawing/2010/main" val="0"/>
+              </a:ext>
+            </a:extLst>
+          </a:blip>
+          <a:stretch>
+            <a:fillRect/>
+          </a:stretch>
+        </p:blipFill>
+        <p:spPr>
+          <a:xfrm>
+            <a:off x="1773953" y="1484784"/>
+            <a:ext cx="5596094" cy="5212800"/>
+          </a:xfrm>
+          <a:prstGeom prst="rect">
+            <a:avLst/>
+          </a:prstGeom>
+        </p:spPr>
+      </p:pic>
+      <p:sp>
+        <p:nvSpPr>
+          <p:cNvPr id="9" name="Retângulo 8"/>
+          <p:cNvSpPr/>
+          <p:nvPr/>
+        </p:nvSpPr>
+        <p:spPr>
+          <a:xfrm>
+            <a:off x="288032" y="1700808"/>
+            <a:ext cx="4572000" cy="307777"/>
+          </a:xfrm>
+          <a:prstGeom prst="rect">
+            <a:avLst/>
+          </a:prstGeom>
+        </p:spPr>
+        <p:txBody>
+          <a:bodyPr>
+            <a:spAutoFit/>
+          </a:bodyPr>
+          <a:lstStyle/>
+          <a:p>
+            <a:r>
+              <a:rPr lang="pt-BR" sz="1400" dirty="0" smtClean="0"/>
+              <a:t>Telas Administrador</a:t>
+            </a:r>
+            <a:endParaRPr lang="pt-BR" sz="1400" dirty="0"/>
+          </a:p>
+        </p:txBody>
+      </p:sp>
+    </p:spTree>
+  </p:cSld>
+  <p:clrMapOvr>
+    <a:masterClrMapping/>
+  </p:clrMapOvr>
+  <p:transition spd="med">
+    <p:fade/>
+  </p:transition>
+  <p:timing>
+    <p:tnLst>
+      <p:par>
+        <p:cTn id="1" dur="indefinite" restart="never" nodeType="tmRoot"/>
+      </p:par>
+    </p:tnLst>
+  </p:timing>
+</p:sld>
+</file>
+
+<file path=ppt/slides/slide34.xml><?xml version="1.0" encoding="utf-8"?>
+<p:sld xmlns:a="http://schemas.openxmlformats.org/drawingml/2006/main" xmlns:r="http://schemas.openxmlformats.org/officeDocument/2006/relationships" xmlns:p="http://schemas.openxmlformats.org/presentationml/2006/main">
+  <p:cSld>
+    <p:spTree>
+      <p:nvGrpSpPr>
+        <p:cNvPr id="1" name=""/>
+        <p:cNvGrpSpPr/>
+        <p:nvPr/>
+      </p:nvGrpSpPr>
+      <p:grpSpPr>
+        <a:xfrm>
+          <a:off x="0" y="0"/>
+          <a:ext cx="0" cy="0"/>
+          <a:chOff x="0" y="0"/>
+          <a:chExt cx="0" cy="0"/>
+        </a:xfrm>
+      </p:grpSpPr>
+      <p:sp>
+        <p:nvSpPr>
+          <p:cNvPr id="19458" name="Rectangle 2"/>
+          <p:cNvSpPr>
+            <a:spLocks noGrp="1" noChangeArrowheads="1"/>
+          </p:cNvSpPr>
+          <p:nvPr>
+            <p:ph type="title"/>
+          </p:nvPr>
+        </p:nvSpPr>
+        <p:spPr/>
+        <p:txBody>
+          <a:bodyPr/>
+          <a:lstStyle/>
+          <a:p>
+            <a:r>
+              <a:rPr lang="pt-BR" dirty="0" smtClean="0"/>
+              <a:t>Protótipo de Baixa Fidelidade</a:t>
+            </a:r>
+            <a:endParaRPr lang="pt-BR" dirty="0"/>
+          </a:p>
+        </p:txBody>
+      </p:sp>
+      <p:sp>
+        <p:nvSpPr>
+          <p:cNvPr id="6" name="Espaço Reservado para Data 5"/>
+          <p:cNvSpPr>
+            <a:spLocks noGrp="1"/>
+          </p:cNvSpPr>
+          <p:nvPr>
+            <p:ph type="dt" sz="half" idx="10"/>
+          </p:nvPr>
+        </p:nvSpPr>
+        <p:spPr/>
+        <p:txBody>
+          <a:bodyPr/>
+          <a:lstStyle/>
+          <a:p>
+            <a:r>
+              <a:rPr lang="pt-BR" dirty="0" smtClean="0"/>
+              <a:t>22/09/2014</a:t>
+            </a:r>
+          </a:p>
+          <a:p>
+            <a:endParaRPr lang="pt-BR" dirty="0"/>
+          </a:p>
+        </p:txBody>
+      </p:sp>
+      <p:sp>
+        <p:nvSpPr>
+          <p:cNvPr id="7" name="Espaço Reservado para Número de Slide 6"/>
+          <p:cNvSpPr>
+            <a:spLocks noGrp="1"/>
+          </p:cNvSpPr>
+          <p:nvPr>
+            <p:ph type="sldNum" sz="quarter" idx="12"/>
+          </p:nvPr>
+        </p:nvSpPr>
+        <p:spPr/>
+        <p:txBody>
+          <a:bodyPr/>
+          <a:lstStyle/>
+          <a:p>
+            <a:fld id="{516476CB-12D4-456A-BCEE-8469A8C40045}" type="slidenum">
+              <a:rPr lang="pt-BR" smtClean="0"/>
+              <a:pPr/>
+              <a:t>34</a:t>
+            </a:fld>
+            <a:endParaRPr lang="pt-BR" dirty="0"/>
+          </a:p>
+        </p:txBody>
+      </p:sp>
+      <p:sp>
+        <p:nvSpPr>
+          <p:cNvPr id="8" name="Espaço Reservado para Rodapé 7"/>
+          <p:cNvSpPr>
+            <a:spLocks noGrp="1"/>
+          </p:cNvSpPr>
+          <p:nvPr>
+            <p:ph type="ftr" sz="quarter" idx="11"/>
+          </p:nvPr>
+        </p:nvSpPr>
+        <p:spPr/>
+        <p:txBody>
+          <a:bodyPr/>
+          <a:lstStyle/>
+          <a:p>
+            <a:r>
+              <a:rPr lang="pt-BR" dirty="0" smtClean="0"/>
+              <a:t>IBTA Faculdades</a:t>
+            </a:r>
+          </a:p>
+          <a:p>
+            <a:r>
+              <a:rPr lang="pt-BR" dirty="0" smtClean="0"/>
+              <a:t>TCM/3ADS</a:t>
+            </a:r>
+            <a:endParaRPr lang="pt-BR" dirty="0"/>
+          </a:p>
+        </p:txBody>
+      </p:sp>
+      <p:pic>
+        <p:nvPicPr>
+          <p:cNvPr id="2" name="Imagem 1"/>
+          <p:cNvPicPr>
+            <a:picLocks noChangeAspect="1"/>
+          </p:cNvPicPr>
+          <p:nvPr/>
+        </p:nvPicPr>
+        <p:blipFill>
+          <a:blip r:embed="rId2">
+            <a:extLst>
+              <a:ext uri="{28A0092B-C50C-407E-A947-70E740481C1C}">
+                <a14:useLocalDpi xmlns:a14="http://schemas.microsoft.com/office/drawing/2010/main" val="0"/>
+              </a:ext>
+            </a:extLst>
+          </a:blip>
+          <a:stretch>
+            <a:fillRect/>
+          </a:stretch>
+        </p:blipFill>
+        <p:spPr>
+          <a:xfrm>
+            <a:off x="1773953" y="1456560"/>
+            <a:ext cx="5596094" cy="5212800"/>
+          </a:xfrm>
+          <a:prstGeom prst="rect">
+            <a:avLst/>
+          </a:prstGeom>
+        </p:spPr>
+      </p:pic>
+      <p:sp>
+        <p:nvSpPr>
+          <p:cNvPr id="9" name="Retângulo 8"/>
+          <p:cNvSpPr/>
+          <p:nvPr/>
+        </p:nvSpPr>
+        <p:spPr>
+          <a:xfrm>
+            <a:off x="288032" y="1700808"/>
+            <a:ext cx="4572000" cy="307777"/>
+          </a:xfrm>
+          <a:prstGeom prst="rect">
+            <a:avLst/>
+          </a:prstGeom>
+        </p:spPr>
+        <p:txBody>
+          <a:bodyPr>
+            <a:spAutoFit/>
+          </a:bodyPr>
+          <a:lstStyle/>
+          <a:p>
+            <a:r>
+              <a:rPr lang="pt-BR" sz="1400" dirty="0" smtClean="0"/>
+              <a:t>Telas Administrador</a:t>
+            </a:r>
+            <a:endParaRPr lang="pt-BR" sz="1400" dirty="0"/>
+          </a:p>
+        </p:txBody>
+      </p:sp>
+    </p:spTree>
+  </p:cSld>
+  <p:clrMapOvr>
+    <a:masterClrMapping/>
+  </p:clrMapOvr>
+  <p:transition spd="med">
+    <p:fade/>
+  </p:transition>
+  <p:timing>
+    <p:tnLst>
+      <p:par>
+        <p:cTn id="1" dur="indefinite" restart="never" nodeType="tmRoot"/>
+      </p:par>
+    </p:tnLst>
+  </p:timing>
+</p:sld>
+</file>
+
+<file path=ppt/slides/slide35.xml><?xml version="1.0" encoding="utf-8"?>
+<p:sld xmlns:a="http://schemas.openxmlformats.org/drawingml/2006/main" xmlns:r="http://schemas.openxmlformats.org/officeDocument/2006/relationships" xmlns:p="http://schemas.openxmlformats.org/presentationml/2006/main">
+  <p:cSld>
+    <p:spTree>
+      <p:nvGrpSpPr>
+        <p:cNvPr id="1" name=""/>
+        <p:cNvGrpSpPr/>
+        <p:nvPr/>
+      </p:nvGrpSpPr>
+      <p:grpSpPr>
+        <a:xfrm>
+          <a:off x="0" y="0"/>
+          <a:ext cx="0" cy="0"/>
+          <a:chOff x="0" y="0"/>
+          <a:chExt cx="0" cy="0"/>
+        </a:xfrm>
+      </p:grpSpPr>
+      <p:sp>
+        <p:nvSpPr>
+          <p:cNvPr id="19458" name="Rectangle 2"/>
+          <p:cNvSpPr>
+            <a:spLocks noGrp="1" noChangeArrowheads="1"/>
+          </p:cNvSpPr>
+          <p:nvPr>
+            <p:ph type="title"/>
+          </p:nvPr>
+        </p:nvSpPr>
+        <p:spPr/>
+        <p:txBody>
+          <a:bodyPr/>
+          <a:lstStyle/>
+          <a:p>
+            <a:r>
+              <a:rPr lang="pt-BR" dirty="0" smtClean="0"/>
+              <a:t>Protótipo de Baixa Fidelidade</a:t>
+            </a:r>
+            <a:endParaRPr lang="pt-BR" dirty="0"/>
+          </a:p>
+        </p:txBody>
+      </p:sp>
+      <p:sp>
+        <p:nvSpPr>
+          <p:cNvPr id="6" name="Espaço Reservado para Data 5"/>
+          <p:cNvSpPr>
+            <a:spLocks noGrp="1"/>
+          </p:cNvSpPr>
+          <p:nvPr>
+            <p:ph type="dt" sz="half" idx="10"/>
+          </p:nvPr>
+        </p:nvSpPr>
+        <p:spPr/>
+        <p:txBody>
+          <a:bodyPr/>
+          <a:lstStyle/>
+          <a:p>
+            <a:r>
+              <a:rPr lang="pt-BR" dirty="0" smtClean="0"/>
+              <a:t>22/09/2014</a:t>
+            </a:r>
+          </a:p>
+          <a:p>
+            <a:endParaRPr lang="pt-BR" dirty="0"/>
+          </a:p>
+        </p:txBody>
+      </p:sp>
+      <p:sp>
+        <p:nvSpPr>
+          <p:cNvPr id="7" name="Espaço Reservado para Número de Slide 6"/>
+          <p:cNvSpPr>
+            <a:spLocks noGrp="1"/>
+          </p:cNvSpPr>
+          <p:nvPr>
+            <p:ph type="sldNum" sz="quarter" idx="12"/>
+          </p:nvPr>
+        </p:nvSpPr>
+        <p:spPr/>
+        <p:txBody>
+          <a:bodyPr/>
+          <a:lstStyle/>
+          <a:p>
+            <a:fld id="{516476CB-12D4-456A-BCEE-8469A8C40045}" type="slidenum">
+              <a:rPr lang="pt-BR" smtClean="0"/>
+              <a:pPr/>
+              <a:t>35</a:t>
+            </a:fld>
+            <a:endParaRPr lang="pt-BR" dirty="0"/>
+          </a:p>
+        </p:txBody>
+      </p:sp>
+      <p:sp>
+        <p:nvSpPr>
+          <p:cNvPr id="8" name="Espaço Reservado para Rodapé 7"/>
+          <p:cNvSpPr>
+            <a:spLocks noGrp="1"/>
+          </p:cNvSpPr>
+          <p:nvPr>
+            <p:ph type="ftr" sz="quarter" idx="11"/>
+          </p:nvPr>
+        </p:nvSpPr>
+        <p:spPr/>
+        <p:txBody>
+          <a:bodyPr/>
+          <a:lstStyle/>
+          <a:p>
+            <a:r>
+              <a:rPr lang="pt-BR" dirty="0" smtClean="0"/>
+              <a:t>IBTA Faculdades</a:t>
+            </a:r>
+          </a:p>
+          <a:p>
+            <a:r>
+              <a:rPr lang="pt-BR" dirty="0" smtClean="0"/>
+              <a:t>TCM/3ADS</a:t>
+            </a:r>
+            <a:endParaRPr lang="pt-BR" dirty="0"/>
+          </a:p>
+        </p:txBody>
+      </p:sp>
+      <p:pic>
+        <p:nvPicPr>
+          <p:cNvPr id="2" name="Imagem 1"/>
+          <p:cNvPicPr>
+            <a:picLocks noChangeAspect="1"/>
+          </p:cNvPicPr>
+          <p:nvPr/>
+        </p:nvPicPr>
+        <p:blipFill>
+          <a:blip r:embed="rId2">
+            <a:extLst>
+              <a:ext uri="{28A0092B-C50C-407E-A947-70E740481C1C}">
+                <a14:useLocalDpi xmlns:a14="http://schemas.microsoft.com/office/drawing/2010/main" val="0"/>
+              </a:ext>
+            </a:extLst>
+          </a:blip>
+          <a:stretch>
+            <a:fillRect/>
+          </a:stretch>
+        </p:blipFill>
+        <p:spPr>
+          <a:xfrm>
+            <a:off x="1773953" y="1456560"/>
+            <a:ext cx="5596094" cy="5212800"/>
+          </a:xfrm>
+          <a:prstGeom prst="rect">
+            <a:avLst/>
+          </a:prstGeom>
+        </p:spPr>
+      </p:pic>
+      <p:sp>
+        <p:nvSpPr>
+          <p:cNvPr id="9" name="Retângulo 8"/>
+          <p:cNvSpPr/>
+          <p:nvPr/>
+        </p:nvSpPr>
+        <p:spPr>
+          <a:xfrm>
+            <a:off x="288032" y="1700808"/>
+            <a:ext cx="4572000" cy="307777"/>
+          </a:xfrm>
+          <a:prstGeom prst="rect">
+            <a:avLst/>
+          </a:prstGeom>
+        </p:spPr>
+        <p:txBody>
+          <a:bodyPr>
+            <a:spAutoFit/>
+          </a:bodyPr>
+          <a:lstStyle/>
+          <a:p>
+            <a:r>
+              <a:rPr lang="pt-BR" sz="1400" dirty="0" smtClean="0"/>
+              <a:t>Telas Administrador</a:t>
+            </a:r>
+            <a:endParaRPr lang="pt-BR" sz="1400" dirty="0"/>
+          </a:p>
+        </p:txBody>
+      </p:sp>
+    </p:spTree>
+  </p:cSld>
+  <p:clrMapOvr>
+    <a:masterClrMapping/>
+  </p:clrMapOvr>
+  <p:transition spd="med">
+    <p:fade/>
+  </p:transition>
+  <p:timing>
+    <p:tnLst>
+      <p:par>
+        <p:cTn id="1" dur="indefinite" restart="never" nodeType="tmRoot"/>
+      </p:par>
+    </p:tnLst>
+  </p:timing>
+</p:sld>
+</file>
+
+<file path=ppt/slides/slide36.xml><?xml version="1.0" encoding="utf-8"?>
+<p:sld xmlns:a="http://schemas.openxmlformats.org/drawingml/2006/main" xmlns:r="http://schemas.openxmlformats.org/officeDocument/2006/relationships" xmlns:p="http://schemas.openxmlformats.org/presentationml/2006/main">
+  <p:cSld>
+    <p:spTree>
+      <p:nvGrpSpPr>
+        <p:cNvPr id="1" name=""/>
+        <p:cNvGrpSpPr/>
+        <p:nvPr/>
+      </p:nvGrpSpPr>
+      <p:grpSpPr>
+        <a:xfrm>
+          <a:off x="0" y="0"/>
+          <a:ext cx="0" cy="0"/>
+          <a:chOff x="0" y="0"/>
+          <a:chExt cx="0" cy="0"/>
+        </a:xfrm>
+      </p:grpSpPr>
+      <p:sp>
+        <p:nvSpPr>
+          <p:cNvPr id="19458" name="Rectangle 2"/>
+          <p:cNvSpPr>
+            <a:spLocks noGrp="1" noChangeArrowheads="1"/>
+          </p:cNvSpPr>
+          <p:nvPr>
+            <p:ph type="title"/>
+          </p:nvPr>
+        </p:nvSpPr>
+        <p:spPr/>
+        <p:txBody>
+          <a:bodyPr/>
+          <a:lstStyle/>
+          <a:p>
+            <a:r>
+              <a:rPr lang="pt-BR" dirty="0" smtClean="0"/>
+              <a:t>Protótipo de Baixa Fidelidade</a:t>
+            </a:r>
+            <a:endParaRPr lang="pt-BR" dirty="0"/>
+          </a:p>
+        </p:txBody>
+      </p:sp>
+      <p:sp>
+        <p:nvSpPr>
+          <p:cNvPr id="6" name="Espaço Reservado para Data 5"/>
+          <p:cNvSpPr>
+            <a:spLocks noGrp="1"/>
+          </p:cNvSpPr>
+          <p:nvPr>
+            <p:ph type="dt" sz="half" idx="10"/>
+          </p:nvPr>
+        </p:nvSpPr>
+        <p:spPr/>
+        <p:txBody>
+          <a:bodyPr/>
+          <a:lstStyle/>
+          <a:p>
+            <a:r>
+              <a:rPr lang="pt-BR" dirty="0" smtClean="0"/>
+              <a:t>22/09/2014</a:t>
+            </a:r>
+          </a:p>
+          <a:p>
+            <a:endParaRPr lang="pt-BR" dirty="0"/>
+          </a:p>
+        </p:txBody>
+      </p:sp>
+      <p:sp>
+        <p:nvSpPr>
+          <p:cNvPr id="7" name="Espaço Reservado para Número de Slide 6"/>
+          <p:cNvSpPr>
+            <a:spLocks noGrp="1"/>
+          </p:cNvSpPr>
+          <p:nvPr>
+            <p:ph type="sldNum" sz="quarter" idx="12"/>
+          </p:nvPr>
+        </p:nvSpPr>
+        <p:spPr/>
+        <p:txBody>
+          <a:bodyPr/>
+          <a:lstStyle/>
+          <a:p>
+            <a:fld id="{516476CB-12D4-456A-BCEE-8469A8C40045}" type="slidenum">
+              <a:rPr lang="pt-BR" smtClean="0"/>
+              <a:pPr/>
+              <a:t>36</a:t>
+            </a:fld>
+            <a:endParaRPr lang="pt-BR" dirty="0"/>
+          </a:p>
+        </p:txBody>
+      </p:sp>
+      <p:sp>
+        <p:nvSpPr>
+          <p:cNvPr id="8" name="Espaço Reservado para Rodapé 7"/>
+          <p:cNvSpPr>
+            <a:spLocks noGrp="1"/>
+          </p:cNvSpPr>
+          <p:nvPr>
+            <p:ph type="ftr" sz="quarter" idx="11"/>
+          </p:nvPr>
+        </p:nvSpPr>
+        <p:spPr/>
+        <p:txBody>
+          <a:bodyPr/>
+          <a:lstStyle/>
+          <a:p>
+            <a:r>
+              <a:rPr lang="pt-BR" dirty="0" smtClean="0"/>
+              <a:t>IBTA Faculdades</a:t>
+            </a:r>
+          </a:p>
+          <a:p>
+            <a:r>
+              <a:rPr lang="pt-BR" dirty="0" smtClean="0"/>
+              <a:t>TCM/3ADS</a:t>
+            </a:r>
+            <a:endParaRPr lang="pt-BR" dirty="0"/>
+          </a:p>
+        </p:txBody>
+      </p:sp>
+      <p:sp>
+        <p:nvSpPr>
+          <p:cNvPr id="9" name="Retângulo 8"/>
+          <p:cNvSpPr/>
+          <p:nvPr/>
+        </p:nvSpPr>
+        <p:spPr>
+          <a:xfrm>
+            <a:off x="288032" y="1700808"/>
+            <a:ext cx="4572000" cy="307777"/>
+          </a:xfrm>
+          <a:prstGeom prst="rect">
+            <a:avLst/>
+          </a:prstGeom>
+        </p:spPr>
+        <p:txBody>
+          <a:bodyPr>
+            <a:spAutoFit/>
+          </a:bodyPr>
+          <a:lstStyle/>
+          <a:p>
+            <a:r>
+              <a:rPr lang="pt-BR" sz="1400" dirty="0" smtClean="0"/>
+              <a:t>Telas Administrador</a:t>
+            </a:r>
+            <a:endParaRPr lang="pt-BR" sz="1400" dirty="0"/>
+          </a:p>
+        </p:txBody>
+      </p:sp>
+      <p:pic>
+        <p:nvPicPr>
+          <p:cNvPr id="3" name="Imagem 2"/>
+          <p:cNvPicPr>
+            <a:picLocks noChangeAspect="1"/>
+          </p:cNvPicPr>
+          <p:nvPr/>
+        </p:nvPicPr>
+        <p:blipFill>
+          <a:blip r:embed="rId2">
+            <a:extLst>
+              <a:ext uri="{28A0092B-C50C-407E-A947-70E740481C1C}">
+                <a14:useLocalDpi xmlns:a14="http://schemas.microsoft.com/office/drawing/2010/main" val="0"/>
+              </a:ext>
+            </a:extLst>
+          </a:blip>
+          <a:stretch>
+            <a:fillRect/>
+          </a:stretch>
+        </p:blipFill>
+        <p:spPr>
+          <a:xfrm>
+            <a:off x="1773953" y="1456560"/>
+            <a:ext cx="5596094" cy="5212800"/>
+          </a:xfrm>
+          <a:prstGeom prst="rect">
+            <a:avLst/>
+          </a:prstGeom>
+        </p:spPr>
+      </p:pic>
+    </p:spTree>
+    <p:extLst>
+      <p:ext uri="{BB962C8B-B14F-4D97-AF65-F5344CB8AC3E}">
+        <p14:creationId xmlns:p14="http://schemas.microsoft.com/office/powerpoint/2010/main" val="3178628702"/>
+      </p:ext>
+    </p:extLst>
+  </p:cSld>
+  <p:clrMapOvr>
+    <a:masterClrMapping/>
+  </p:clrMapOvr>
+  <p:transition spd="med">
+    <p:fade/>
+  </p:transition>
+  <p:timing>
+    <p:tnLst>
+      <p:par>
+        <p:cTn id="1" dur="indefinite" restart="never" nodeType="tmRoot"/>
+      </p:par>
+    </p:tnLst>
+  </p:timing>
+</p:sld>
+</file>
+
+<file path=ppt/slides/slide37.xml><?xml version="1.0" encoding="utf-8"?>
+<p:sld xmlns:a="http://schemas.openxmlformats.org/drawingml/2006/main" xmlns:r="http://schemas.openxmlformats.org/officeDocument/2006/relationships" xmlns:p="http://schemas.openxmlformats.org/presentationml/2006/main">
+  <p:cSld>
+    <p:spTree>
+      <p:nvGrpSpPr>
+        <p:cNvPr id="1" name=""/>
+        <p:cNvGrpSpPr/>
+        <p:nvPr/>
+      </p:nvGrpSpPr>
+      <p:grpSpPr>
+        <a:xfrm>
+          <a:off x="0" y="0"/>
+          <a:ext cx="0" cy="0"/>
+          <a:chOff x="0" y="0"/>
+          <a:chExt cx="0" cy="0"/>
+        </a:xfrm>
+      </p:grpSpPr>
+      <p:sp>
+        <p:nvSpPr>
+          <p:cNvPr id="19458" name="Rectangle 2"/>
+          <p:cNvSpPr>
+            <a:spLocks noGrp="1" noChangeArrowheads="1"/>
+          </p:cNvSpPr>
+          <p:nvPr>
+            <p:ph type="title"/>
+          </p:nvPr>
+        </p:nvSpPr>
+        <p:spPr/>
+        <p:txBody>
+          <a:bodyPr/>
+          <a:lstStyle/>
+          <a:p>
+            <a:r>
+              <a:rPr lang="pt-BR" dirty="0" smtClean="0"/>
+              <a:t>Protótipo de Baixa Fidelidade</a:t>
+            </a:r>
+            <a:endParaRPr lang="pt-BR" dirty="0"/>
+          </a:p>
+        </p:txBody>
+      </p:sp>
+      <p:sp>
+        <p:nvSpPr>
+          <p:cNvPr id="6" name="Espaço Reservado para Data 5"/>
+          <p:cNvSpPr>
+            <a:spLocks noGrp="1"/>
+          </p:cNvSpPr>
+          <p:nvPr>
+            <p:ph type="dt" sz="half" idx="10"/>
+          </p:nvPr>
+        </p:nvSpPr>
+        <p:spPr/>
+        <p:txBody>
+          <a:bodyPr/>
+          <a:lstStyle/>
+          <a:p>
+            <a:r>
+              <a:rPr lang="pt-BR" dirty="0" smtClean="0"/>
+              <a:t>22/09/2014</a:t>
+            </a:r>
+          </a:p>
+          <a:p>
+            <a:endParaRPr lang="pt-BR" dirty="0"/>
+          </a:p>
+        </p:txBody>
+      </p:sp>
+      <p:sp>
+        <p:nvSpPr>
+          <p:cNvPr id="7" name="Espaço Reservado para Número de Slide 6"/>
+          <p:cNvSpPr>
+            <a:spLocks noGrp="1"/>
+          </p:cNvSpPr>
+          <p:nvPr>
+            <p:ph type="sldNum" sz="quarter" idx="12"/>
+          </p:nvPr>
+        </p:nvSpPr>
+        <p:spPr/>
+        <p:txBody>
+          <a:bodyPr/>
+          <a:lstStyle/>
+          <a:p>
+            <a:fld id="{516476CB-12D4-456A-BCEE-8469A8C40045}" type="slidenum">
+              <a:rPr lang="pt-BR" smtClean="0"/>
+              <a:pPr/>
+              <a:t>37</a:t>
+            </a:fld>
+            <a:endParaRPr lang="pt-BR" dirty="0"/>
+          </a:p>
+        </p:txBody>
+      </p:sp>
+      <p:sp>
+        <p:nvSpPr>
+          <p:cNvPr id="8" name="Espaço Reservado para Rodapé 7"/>
+          <p:cNvSpPr>
+            <a:spLocks noGrp="1"/>
+          </p:cNvSpPr>
+          <p:nvPr>
+            <p:ph type="ftr" sz="quarter" idx="11"/>
+          </p:nvPr>
+        </p:nvSpPr>
+        <p:spPr/>
+        <p:txBody>
+          <a:bodyPr/>
+          <a:lstStyle/>
+          <a:p>
+            <a:r>
+              <a:rPr lang="pt-BR" dirty="0" smtClean="0"/>
+              <a:t>IBTA Faculdades</a:t>
+            </a:r>
+          </a:p>
+          <a:p>
+            <a:r>
+              <a:rPr lang="pt-BR" dirty="0" smtClean="0"/>
+              <a:t>TCM/3ADS</a:t>
+            </a:r>
+            <a:endParaRPr lang="pt-BR" dirty="0"/>
+          </a:p>
+        </p:txBody>
+      </p:sp>
+      <p:pic>
+        <p:nvPicPr>
+          <p:cNvPr id="4" name="Imagem 3"/>
+          <p:cNvPicPr>
+            <a:picLocks noChangeAspect="1"/>
+          </p:cNvPicPr>
+          <p:nvPr/>
+        </p:nvPicPr>
+        <p:blipFill>
+          <a:blip r:embed="rId2">
+            <a:extLst>
+              <a:ext uri="{28A0092B-C50C-407E-A947-70E740481C1C}">
+                <a14:useLocalDpi xmlns:a14="http://schemas.microsoft.com/office/drawing/2010/main" val="0"/>
+              </a:ext>
+            </a:extLst>
+          </a:blip>
+          <a:stretch>
+            <a:fillRect/>
+          </a:stretch>
+        </p:blipFill>
+        <p:spPr>
+          <a:xfrm>
+            <a:off x="1773953" y="1456560"/>
+            <a:ext cx="5596094" cy="5212800"/>
+          </a:xfrm>
+          <a:prstGeom prst="rect">
+            <a:avLst/>
+          </a:prstGeom>
+        </p:spPr>
+      </p:pic>
+      <p:sp>
+        <p:nvSpPr>
+          <p:cNvPr id="9" name="Retângulo 8"/>
+          <p:cNvSpPr/>
+          <p:nvPr/>
+        </p:nvSpPr>
+        <p:spPr>
+          <a:xfrm>
+            <a:off x="288032" y="1700808"/>
+            <a:ext cx="4572000" cy="307777"/>
+          </a:xfrm>
+          <a:prstGeom prst="rect">
+            <a:avLst/>
+          </a:prstGeom>
+        </p:spPr>
+        <p:txBody>
+          <a:bodyPr>
+            <a:spAutoFit/>
+          </a:bodyPr>
+          <a:lstStyle/>
+          <a:p>
+            <a:r>
+              <a:rPr lang="pt-BR" sz="1400" dirty="0" smtClean="0"/>
+              <a:t>Telas Administrador</a:t>
+            </a:r>
+            <a:endParaRPr lang="pt-BR" sz="1400" dirty="0"/>
+          </a:p>
+        </p:txBody>
+      </p:sp>
+    </p:spTree>
+  </p:cSld>
+  <p:clrMapOvr>
+    <a:masterClrMapping/>
+  </p:clrMapOvr>
+  <p:transition spd="med">
+    <p:fade/>
+  </p:transition>
+  <p:timing>
+    <p:tnLst>
+      <p:par>
+        <p:cTn id="1" dur="indefinite" restart="never" nodeType="tmRoot"/>
+      </p:par>
+    </p:tnLst>
+  </p:timing>
+</p:sld>
+</file>
+
+<file path=ppt/slides/slide38.xml><?xml version="1.0" encoding="utf-8"?>
+<p:sld xmlns:a="http://schemas.openxmlformats.org/drawingml/2006/main" xmlns:r="http://schemas.openxmlformats.org/officeDocument/2006/relationships" xmlns:p="http://schemas.openxmlformats.org/presentationml/2006/main">
+  <p:cSld>
+    <p:spTree>
+      <p:nvGrpSpPr>
+        <p:cNvPr id="1" name=""/>
+        <p:cNvGrpSpPr/>
+        <p:nvPr/>
+      </p:nvGrpSpPr>
+      <p:grpSpPr>
+        <a:xfrm>
+          <a:off x="0" y="0"/>
+          <a:ext cx="0" cy="0"/>
+          <a:chOff x="0" y="0"/>
+          <a:chExt cx="0" cy="0"/>
+        </a:xfrm>
+      </p:grpSpPr>
+      <p:sp>
+        <p:nvSpPr>
+          <p:cNvPr id="19458" name="Rectangle 2"/>
+          <p:cNvSpPr>
+            <a:spLocks noGrp="1" noChangeArrowheads="1"/>
+          </p:cNvSpPr>
+          <p:nvPr>
+            <p:ph type="title"/>
+          </p:nvPr>
+        </p:nvSpPr>
+        <p:spPr/>
+        <p:txBody>
+          <a:bodyPr/>
+          <a:lstStyle/>
+          <a:p>
+            <a:r>
+              <a:rPr lang="pt-BR" dirty="0" smtClean="0"/>
+              <a:t>Protótipo de Baixa Fidelidade</a:t>
+            </a:r>
+            <a:endParaRPr lang="pt-BR" dirty="0"/>
+          </a:p>
+        </p:txBody>
+      </p:sp>
+      <p:sp>
+        <p:nvSpPr>
+          <p:cNvPr id="6" name="Espaço Reservado para Data 5"/>
+          <p:cNvSpPr>
+            <a:spLocks noGrp="1"/>
+          </p:cNvSpPr>
+          <p:nvPr>
+            <p:ph type="dt" sz="half" idx="10"/>
+          </p:nvPr>
+        </p:nvSpPr>
+        <p:spPr/>
+        <p:txBody>
+          <a:bodyPr/>
+          <a:lstStyle/>
+          <a:p>
+            <a:r>
+              <a:rPr lang="pt-BR" dirty="0" smtClean="0"/>
+              <a:t>22/09/2014</a:t>
+            </a:r>
+          </a:p>
+          <a:p>
+            <a:endParaRPr lang="pt-BR" dirty="0"/>
+          </a:p>
+        </p:txBody>
+      </p:sp>
+      <p:sp>
+        <p:nvSpPr>
+          <p:cNvPr id="7" name="Espaço Reservado para Número de Slide 6"/>
+          <p:cNvSpPr>
+            <a:spLocks noGrp="1"/>
+          </p:cNvSpPr>
+          <p:nvPr>
+            <p:ph type="sldNum" sz="quarter" idx="12"/>
+          </p:nvPr>
+        </p:nvSpPr>
+        <p:spPr/>
+        <p:txBody>
+          <a:bodyPr/>
+          <a:lstStyle/>
+          <a:p>
+            <a:fld id="{516476CB-12D4-456A-BCEE-8469A8C40045}" type="slidenum">
+              <a:rPr lang="pt-BR" smtClean="0"/>
+              <a:pPr/>
+              <a:t>38</a:t>
+            </a:fld>
+            <a:endParaRPr lang="pt-BR" dirty="0"/>
+          </a:p>
+        </p:txBody>
+      </p:sp>
+      <p:sp>
+        <p:nvSpPr>
+          <p:cNvPr id="8" name="Espaço Reservado para Rodapé 7"/>
+          <p:cNvSpPr>
+            <a:spLocks noGrp="1"/>
+          </p:cNvSpPr>
+          <p:nvPr>
+            <p:ph type="ftr" sz="quarter" idx="11"/>
+          </p:nvPr>
+        </p:nvSpPr>
+        <p:spPr/>
+        <p:txBody>
+          <a:bodyPr/>
+          <a:lstStyle/>
+          <a:p>
+            <a:r>
+              <a:rPr lang="pt-BR" dirty="0" smtClean="0"/>
+              <a:t>IBTA Faculdades</a:t>
+            </a:r>
+          </a:p>
+          <a:p>
+            <a:r>
+              <a:rPr lang="pt-BR" dirty="0" smtClean="0"/>
+              <a:t>TCM/3ADS</a:t>
+            </a:r>
+            <a:endParaRPr lang="pt-BR" dirty="0"/>
+          </a:p>
+        </p:txBody>
+      </p:sp>
+      <p:pic>
+        <p:nvPicPr>
+          <p:cNvPr id="2" name="Imagem 1"/>
+          <p:cNvPicPr>
+            <a:picLocks noChangeAspect="1"/>
+          </p:cNvPicPr>
+          <p:nvPr/>
+        </p:nvPicPr>
+        <p:blipFill>
+          <a:blip r:embed="rId2">
+            <a:extLst>
+              <a:ext uri="{28A0092B-C50C-407E-A947-70E740481C1C}">
+                <a14:useLocalDpi xmlns:a14="http://schemas.microsoft.com/office/drawing/2010/main" val="0"/>
+              </a:ext>
+            </a:extLst>
+          </a:blip>
+          <a:stretch>
+            <a:fillRect/>
+          </a:stretch>
+        </p:blipFill>
+        <p:spPr>
+          <a:xfrm>
+            <a:off x="1773953" y="1456560"/>
+            <a:ext cx="5596094" cy="5212800"/>
+          </a:xfrm>
+          <a:prstGeom prst="rect">
+            <a:avLst/>
+          </a:prstGeom>
+        </p:spPr>
+      </p:pic>
+      <p:sp>
+        <p:nvSpPr>
+          <p:cNvPr id="9" name="Retângulo 8"/>
+          <p:cNvSpPr/>
+          <p:nvPr/>
+        </p:nvSpPr>
+        <p:spPr>
+          <a:xfrm>
+            <a:off x="288032" y="1700808"/>
+            <a:ext cx="4572000" cy="307777"/>
+          </a:xfrm>
+          <a:prstGeom prst="rect">
+            <a:avLst/>
+          </a:prstGeom>
+        </p:spPr>
+        <p:txBody>
+          <a:bodyPr>
+            <a:spAutoFit/>
+          </a:bodyPr>
+          <a:lstStyle/>
+          <a:p>
+            <a:r>
+              <a:rPr lang="pt-BR" sz="1400" dirty="0" smtClean="0"/>
+              <a:t>Telas Administrador</a:t>
+            </a:r>
+            <a:endParaRPr lang="pt-BR" sz="1400" dirty="0"/>
+          </a:p>
+        </p:txBody>
+      </p:sp>
+    </p:spTree>
+  </p:cSld>
+  <p:clrMapOvr>
+    <a:masterClrMapping/>
+  </p:clrMapOvr>
+  <p:transition spd="med">
+    <p:fade/>
+  </p:transition>
+  <p:timing>
+    <p:tnLst>
+      <p:par>
+        <p:cTn id="1" dur="indefinite" restart="never" nodeType="tmRoot"/>
+      </p:par>
+    </p:tnLst>
+  </p:timing>
+</p:sld>
+</file>
+
+<file path=ppt/slides/slide39.xml><?xml version="1.0" encoding="utf-8"?>
+<p:sld xmlns:a="http://schemas.openxmlformats.org/drawingml/2006/main" xmlns:r="http://schemas.openxmlformats.org/officeDocument/2006/relationships" xmlns:p="http://schemas.openxmlformats.org/presentationml/2006/main">
+  <p:cSld>
+    <p:spTree>
+      <p:nvGrpSpPr>
+        <p:cNvPr id="1" name=""/>
+        <p:cNvGrpSpPr/>
+        <p:nvPr/>
+      </p:nvGrpSpPr>
+      <p:grpSpPr>
+        <a:xfrm>
+          <a:off x="0" y="0"/>
+          <a:ext cx="0" cy="0"/>
+          <a:chOff x="0" y="0"/>
+          <a:chExt cx="0" cy="0"/>
+        </a:xfrm>
+      </p:grpSpPr>
+      <p:sp>
+        <p:nvSpPr>
+          <p:cNvPr id="19458" name="Rectangle 2"/>
+          <p:cNvSpPr>
+            <a:spLocks noGrp="1" noChangeArrowheads="1"/>
+          </p:cNvSpPr>
+          <p:nvPr>
+            <p:ph type="title"/>
+          </p:nvPr>
+        </p:nvSpPr>
+        <p:spPr/>
+        <p:txBody>
+          <a:bodyPr/>
+          <a:lstStyle/>
+          <a:p>
+            <a:r>
+              <a:rPr lang="pt-BR" dirty="0" smtClean="0"/>
+              <a:t>Protótipo de Baixa Fidelidade</a:t>
+            </a:r>
+            <a:endParaRPr lang="pt-BR" dirty="0"/>
+          </a:p>
+        </p:txBody>
+      </p:sp>
+      <p:sp>
+        <p:nvSpPr>
+          <p:cNvPr id="6" name="Espaço Reservado para Data 5"/>
+          <p:cNvSpPr>
+            <a:spLocks noGrp="1"/>
+          </p:cNvSpPr>
+          <p:nvPr>
+            <p:ph type="dt" sz="half" idx="10"/>
+          </p:nvPr>
+        </p:nvSpPr>
+        <p:spPr/>
+        <p:txBody>
+          <a:bodyPr/>
+          <a:lstStyle/>
+          <a:p>
+            <a:r>
+              <a:rPr lang="pt-BR" dirty="0" smtClean="0"/>
+              <a:t>22/09/2014</a:t>
+            </a:r>
+          </a:p>
+          <a:p>
+            <a:endParaRPr lang="pt-BR" dirty="0"/>
+          </a:p>
+        </p:txBody>
+      </p:sp>
+      <p:sp>
+        <p:nvSpPr>
+          <p:cNvPr id="7" name="Espaço Reservado para Número de Slide 6"/>
+          <p:cNvSpPr>
+            <a:spLocks noGrp="1"/>
+          </p:cNvSpPr>
+          <p:nvPr>
+            <p:ph type="sldNum" sz="quarter" idx="12"/>
+          </p:nvPr>
+        </p:nvSpPr>
+        <p:spPr/>
+        <p:txBody>
+          <a:bodyPr/>
+          <a:lstStyle/>
+          <a:p>
+            <a:fld id="{516476CB-12D4-456A-BCEE-8469A8C40045}" type="slidenum">
+              <a:rPr lang="pt-BR" smtClean="0"/>
+              <a:pPr/>
+              <a:t>39</a:t>
+            </a:fld>
+            <a:endParaRPr lang="pt-BR" dirty="0"/>
+          </a:p>
+        </p:txBody>
+      </p:sp>
+      <p:sp>
+        <p:nvSpPr>
+          <p:cNvPr id="8" name="Espaço Reservado para Rodapé 7"/>
+          <p:cNvSpPr>
+            <a:spLocks noGrp="1"/>
+          </p:cNvSpPr>
+          <p:nvPr>
+            <p:ph type="ftr" sz="quarter" idx="11"/>
+          </p:nvPr>
+        </p:nvSpPr>
+        <p:spPr/>
+        <p:txBody>
+          <a:bodyPr/>
+          <a:lstStyle/>
+          <a:p>
+            <a:r>
+              <a:rPr lang="pt-BR" dirty="0" smtClean="0"/>
+              <a:t>IBTA Faculdades</a:t>
+            </a:r>
+          </a:p>
+          <a:p>
+            <a:r>
+              <a:rPr lang="pt-BR" dirty="0" smtClean="0"/>
+              <a:t>TCM/3ADS</a:t>
+            </a:r>
+            <a:endParaRPr lang="pt-BR" dirty="0"/>
+          </a:p>
+        </p:txBody>
+      </p:sp>
+      <p:pic>
+        <p:nvPicPr>
+          <p:cNvPr id="2" name="Imagem 1"/>
+          <p:cNvPicPr>
+            <a:picLocks noChangeAspect="1"/>
+          </p:cNvPicPr>
+          <p:nvPr/>
+        </p:nvPicPr>
+        <p:blipFill>
+          <a:blip r:embed="rId2">
+            <a:extLst>
+              <a:ext uri="{28A0092B-C50C-407E-A947-70E740481C1C}">
+                <a14:useLocalDpi xmlns:a14="http://schemas.microsoft.com/office/drawing/2010/main" val="0"/>
+              </a:ext>
+            </a:extLst>
+          </a:blip>
+          <a:stretch>
+            <a:fillRect/>
+          </a:stretch>
+        </p:blipFill>
+        <p:spPr>
+          <a:xfrm>
+            <a:off x="1773953" y="1456560"/>
+            <a:ext cx="5596094" cy="5212800"/>
+          </a:xfrm>
+          <a:prstGeom prst="rect">
+            <a:avLst/>
+          </a:prstGeom>
+        </p:spPr>
+      </p:pic>
+      <p:sp>
+        <p:nvSpPr>
+          <p:cNvPr id="9" name="Retângulo 8"/>
+          <p:cNvSpPr/>
+          <p:nvPr/>
+        </p:nvSpPr>
+        <p:spPr>
+          <a:xfrm>
+            <a:off x="288032" y="1700808"/>
+            <a:ext cx="4572000" cy="307777"/>
+          </a:xfrm>
+          <a:prstGeom prst="rect">
+            <a:avLst/>
+          </a:prstGeom>
+        </p:spPr>
+        <p:txBody>
+          <a:bodyPr>
+            <a:spAutoFit/>
+          </a:bodyPr>
+          <a:lstStyle/>
+          <a:p>
+            <a:r>
+              <a:rPr lang="pt-BR" sz="1400" dirty="0" smtClean="0"/>
+              <a:t>Telas Administrador</a:t>
+            </a:r>
+            <a:endParaRPr lang="pt-BR" sz="1400" dirty="0"/>
           </a:p>
         </p:txBody>
       </p:sp>
@@ -9383,11 +11436,7 @@
           <a:p>
             <a:r>
               <a:rPr lang="pt-BR" sz="2400" dirty="0" smtClean="0"/>
-              <a:t>Máximo </a:t>
-            </a:r>
-            <a:r>
-              <a:rPr lang="pt-BR" sz="2400" dirty="0" smtClean="0"/>
-              <a:t>de praticidade para o paciente.</a:t>
+              <a:t>Máximo de praticidade para o paciente.</a:t>
             </a:r>
             <a:endParaRPr lang="en-US" sz="2400" dirty="0" smtClean="0"/>
           </a:p>
@@ -9460,6 +11509,601 @@
               <a:t>4</a:t>
             </a:fld>
             <a:endParaRPr lang="pt-BR"/>
+          </a:p>
+        </p:txBody>
+      </p:sp>
+      <p:sp>
+        <p:nvSpPr>
+          <p:cNvPr id="8" name="Espaço Reservado para Rodapé 7"/>
+          <p:cNvSpPr>
+            <a:spLocks noGrp="1"/>
+          </p:cNvSpPr>
+          <p:nvPr>
+            <p:ph type="ftr" sz="quarter" idx="11"/>
+          </p:nvPr>
+        </p:nvSpPr>
+        <p:spPr/>
+        <p:txBody>
+          <a:bodyPr/>
+          <a:lstStyle/>
+          <a:p>
+            <a:r>
+              <a:rPr lang="pt-BR" dirty="0" smtClean="0"/>
+              <a:t>IBTA Faculdades</a:t>
+            </a:r>
+          </a:p>
+          <a:p>
+            <a:r>
+              <a:rPr lang="pt-BR" dirty="0" smtClean="0"/>
+              <a:t>TCM/3ADS</a:t>
+            </a:r>
+            <a:endParaRPr lang="pt-BR" dirty="0"/>
+          </a:p>
+        </p:txBody>
+      </p:sp>
+    </p:spTree>
+  </p:cSld>
+  <p:clrMapOvr>
+    <a:masterClrMapping/>
+  </p:clrMapOvr>
+  <p:transition spd="med">
+    <p:fade/>
+  </p:transition>
+  <p:timing>
+    <p:tnLst>
+      <p:par>
+        <p:cTn id="1" dur="indefinite" restart="never" nodeType="tmRoot"/>
+      </p:par>
+    </p:tnLst>
+  </p:timing>
+</p:sld>
+</file>
+
+<file path=ppt/slides/slide40.xml><?xml version="1.0" encoding="utf-8"?>
+<p:sld xmlns:a="http://schemas.openxmlformats.org/drawingml/2006/main" xmlns:r="http://schemas.openxmlformats.org/officeDocument/2006/relationships" xmlns:p="http://schemas.openxmlformats.org/presentationml/2006/main">
+  <p:cSld>
+    <p:spTree>
+      <p:nvGrpSpPr>
+        <p:cNvPr id="1" name=""/>
+        <p:cNvGrpSpPr/>
+        <p:nvPr/>
+      </p:nvGrpSpPr>
+      <p:grpSpPr>
+        <a:xfrm>
+          <a:off x="0" y="0"/>
+          <a:ext cx="0" cy="0"/>
+          <a:chOff x="0" y="0"/>
+          <a:chExt cx="0" cy="0"/>
+        </a:xfrm>
+      </p:grpSpPr>
+      <p:sp>
+        <p:nvSpPr>
+          <p:cNvPr id="19458" name="Rectangle 2"/>
+          <p:cNvSpPr>
+            <a:spLocks noGrp="1" noChangeArrowheads="1"/>
+          </p:cNvSpPr>
+          <p:nvPr>
+            <p:ph type="title"/>
+          </p:nvPr>
+        </p:nvSpPr>
+        <p:spPr/>
+        <p:txBody>
+          <a:bodyPr/>
+          <a:lstStyle/>
+          <a:p>
+            <a:r>
+              <a:rPr lang="pt-BR" dirty="0" smtClean="0"/>
+              <a:t>Protótipo de Baixa Fidelidade</a:t>
+            </a:r>
+            <a:endParaRPr lang="pt-BR" dirty="0"/>
+          </a:p>
+        </p:txBody>
+      </p:sp>
+      <p:sp>
+        <p:nvSpPr>
+          <p:cNvPr id="6" name="Espaço Reservado para Data 5"/>
+          <p:cNvSpPr>
+            <a:spLocks noGrp="1"/>
+          </p:cNvSpPr>
+          <p:nvPr>
+            <p:ph type="dt" sz="half" idx="10"/>
+          </p:nvPr>
+        </p:nvSpPr>
+        <p:spPr/>
+        <p:txBody>
+          <a:bodyPr/>
+          <a:lstStyle/>
+          <a:p>
+            <a:r>
+              <a:rPr lang="pt-BR" dirty="0" smtClean="0"/>
+              <a:t>22/09/2014</a:t>
+            </a:r>
+          </a:p>
+          <a:p>
+            <a:endParaRPr lang="pt-BR" dirty="0"/>
+          </a:p>
+        </p:txBody>
+      </p:sp>
+      <p:sp>
+        <p:nvSpPr>
+          <p:cNvPr id="7" name="Espaço Reservado para Número de Slide 6"/>
+          <p:cNvSpPr>
+            <a:spLocks noGrp="1"/>
+          </p:cNvSpPr>
+          <p:nvPr>
+            <p:ph type="sldNum" sz="quarter" idx="12"/>
+          </p:nvPr>
+        </p:nvSpPr>
+        <p:spPr/>
+        <p:txBody>
+          <a:bodyPr/>
+          <a:lstStyle/>
+          <a:p>
+            <a:fld id="{516476CB-12D4-456A-BCEE-8469A8C40045}" type="slidenum">
+              <a:rPr lang="pt-BR" smtClean="0"/>
+              <a:pPr/>
+              <a:t>40</a:t>
+            </a:fld>
+            <a:endParaRPr lang="pt-BR" dirty="0"/>
+          </a:p>
+        </p:txBody>
+      </p:sp>
+      <p:sp>
+        <p:nvSpPr>
+          <p:cNvPr id="8" name="Espaço Reservado para Rodapé 7"/>
+          <p:cNvSpPr>
+            <a:spLocks noGrp="1"/>
+          </p:cNvSpPr>
+          <p:nvPr>
+            <p:ph type="ftr" sz="quarter" idx="11"/>
+          </p:nvPr>
+        </p:nvSpPr>
+        <p:spPr/>
+        <p:txBody>
+          <a:bodyPr/>
+          <a:lstStyle/>
+          <a:p>
+            <a:r>
+              <a:rPr lang="pt-BR" dirty="0" smtClean="0"/>
+              <a:t>IBTA Faculdades</a:t>
+            </a:r>
+          </a:p>
+          <a:p>
+            <a:r>
+              <a:rPr lang="pt-BR" dirty="0" smtClean="0"/>
+              <a:t>TCM/3ADS</a:t>
+            </a:r>
+            <a:endParaRPr lang="pt-BR" dirty="0"/>
+          </a:p>
+        </p:txBody>
+      </p:sp>
+      <p:pic>
+        <p:nvPicPr>
+          <p:cNvPr id="3" name="Imagem 2"/>
+          <p:cNvPicPr>
+            <a:picLocks noChangeAspect="1"/>
+          </p:cNvPicPr>
+          <p:nvPr/>
+        </p:nvPicPr>
+        <p:blipFill>
+          <a:blip r:embed="rId2">
+            <a:extLst>
+              <a:ext uri="{28A0092B-C50C-407E-A947-70E740481C1C}">
+                <a14:useLocalDpi xmlns:a14="http://schemas.microsoft.com/office/drawing/2010/main" val="0"/>
+              </a:ext>
+            </a:extLst>
+          </a:blip>
+          <a:stretch>
+            <a:fillRect/>
+          </a:stretch>
+        </p:blipFill>
+        <p:spPr>
+          <a:xfrm>
+            <a:off x="1773953" y="1456560"/>
+            <a:ext cx="5596094" cy="5212800"/>
+          </a:xfrm>
+          <a:prstGeom prst="rect">
+            <a:avLst/>
+          </a:prstGeom>
+        </p:spPr>
+      </p:pic>
+      <p:sp>
+        <p:nvSpPr>
+          <p:cNvPr id="9" name="Retângulo 8"/>
+          <p:cNvSpPr/>
+          <p:nvPr/>
+        </p:nvSpPr>
+        <p:spPr>
+          <a:xfrm>
+            <a:off x="288032" y="1700808"/>
+            <a:ext cx="4572000" cy="307777"/>
+          </a:xfrm>
+          <a:prstGeom prst="rect">
+            <a:avLst/>
+          </a:prstGeom>
+        </p:spPr>
+        <p:txBody>
+          <a:bodyPr>
+            <a:spAutoFit/>
+          </a:bodyPr>
+          <a:lstStyle/>
+          <a:p>
+            <a:r>
+              <a:rPr lang="pt-BR" sz="1400" dirty="0" smtClean="0"/>
+              <a:t>Telas Administrador</a:t>
+            </a:r>
+            <a:endParaRPr lang="pt-BR" sz="1400" dirty="0"/>
+          </a:p>
+        </p:txBody>
+      </p:sp>
+    </p:spTree>
+    <p:extLst>
+      <p:ext uri="{BB962C8B-B14F-4D97-AF65-F5344CB8AC3E}">
+        <p14:creationId xmlns:p14="http://schemas.microsoft.com/office/powerpoint/2010/main" val="423922280"/>
+      </p:ext>
+    </p:extLst>
+  </p:cSld>
+  <p:clrMapOvr>
+    <a:masterClrMapping/>
+  </p:clrMapOvr>
+  <p:transition spd="med">
+    <p:fade/>
+  </p:transition>
+  <p:timing>
+    <p:tnLst>
+      <p:par>
+        <p:cTn id="1" dur="indefinite" restart="never" nodeType="tmRoot"/>
+      </p:par>
+    </p:tnLst>
+  </p:timing>
+</p:sld>
+</file>
+
+<file path=ppt/slides/slide41.xml><?xml version="1.0" encoding="utf-8"?>
+<p:sld xmlns:a="http://schemas.openxmlformats.org/drawingml/2006/main" xmlns:r="http://schemas.openxmlformats.org/officeDocument/2006/relationships" xmlns:p="http://schemas.openxmlformats.org/presentationml/2006/main">
+  <p:cSld>
+    <p:spTree>
+      <p:nvGrpSpPr>
+        <p:cNvPr id="1" name=""/>
+        <p:cNvGrpSpPr/>
+        <p:nvPr/>
+      </p:nvGrpSpPr>
+      <p:grpSpPr>
+        <a:xfrm>
+          <a:off x="0" y="0"/>
+          <a:ext cx="0" cy="0"/>
+          <a:chOff x="0" y="0"/>
+          <a:chExt cx="0" cy="0"/>
+        </a:xfrm>
+      </p:grpSpPr>
+      <p:sp>
+        <p:nvSpPr>
+          <p:cNvPr id="19458" name="Rectangle 2"/>
+          <p:cNvSpPr>
+            <a:spLocks noGrp="1" noChangeArrowheads="1"/>
+          </p:cNvSpPr>
+          <p:nvPr>
+            <p:ph type="title"/>
+          </p:nvPr>
+        </p:nvSpPr>
+        <p:spPr/>
+        <p:txBody>
+          <a:bodyPr/>
+          <a:lstStyle/>
+          <a:p>
+            <a:r>
+              <a:rPr lang="pt-BR" dirty="0" smtClean="0"/>
+              <a:t>Protótipo de Baixa Fidelidade</a:t>
+            </a:r>
+            <a:endParaRPr lang="pt-BR" dirty="0"/>
+          </a:p>
+        </p:txBody>
+      </p:sp>
+      <p:sp>
+        <p:nvSpPr>
+          <p:cNvPr id="6" name="Espaço Reservado para Data 5"/>
+          <p:cNvSpPr>
+            <a:spLocks noGrp="1"/>
+          </p:cNvSpPr>
+          <p:nvPr>
+            <p:ph type="dt" sz="half" idx="10"/>
+          </p:nvPr>
+        </p:nvSpPr>
+        <p:spPr/>
+        <p:txBody>
+          <a:bodyPr/>
+          <a:lstStyle/>
+          <a:p>
+            <a:r>
+              <a:rPr lang="pt-BR" dirty="0" smtClean="0"/>
+              <a:t>22/09/2014</a:t>
+            </a:r>
+          </a:p>
+          <a:p>
+            <a:endParaRPr lang="pt-BR" dirty="0"/>
+          </a:p>
+        </p:txBody>
+      </p:sp>
+      <p:sp>
+        <p:nvSpPr>
+          <p:cNvPr id="7" name="Espaço Reservado para Número de Slide 6"/>
+          <p:cNvSpPr>
+            <a:spLocks noGrp="1"/>
+          </p:cNvSpPr>
+          <p:nvPr>
+            <p:ph type="sldNum" sz="quarter" idx="12"/>
+          </p:nvPr>
+        </p:nvSpPr>
+        <p:spPr/>
+        <p:txBody>
+          <a:bodyPr/>
+          <a:lstStyle/>
+          <a:p>
+            <a:fld id="{516476CB-12D4-456A-BCEE-8469A8C40045}" type="slidenum">
+              <a:rPr lang="pt-BR" smtClean="0"/>
+              <a:pPr/>
+              <a:t>41</a:t>
+            </a:fld>
+            <a:endParaRPr lang="pt-BR" dirty="0"/>
+          </a:p>
+        </p:txBody>
+      </p:sp>
+      <p:sp>
+        <p:nvSpPr>
+          <p:cNvPr id="8" name="Espaço Reservado para Rodapé 7"/>
+          <p:cNvSpPr>
+            <a:spLocks noGrp="1"/>
+          </p:cNvSpPr>
+          <p:nvPr>
+            <p:ph type="ftr" sz="quarter" idx="11"/>
+          </p:nvPr>
+        </p:nvSpPr>
+        <p:spPr/>
+        <p:txBody>
+          <a:bodyPr/>
+          <a:lstStyle/>
+          <a:p>
+            <a:r>
+              <a:rPr lang="pt-BR" dirty="0" smtClean="0"/>
+              <a:t>IBTA Faculdades</a:t>
+            </a:r>
+          </a:p>
+          <a:p>
+            <a:r>
+              <a:rPr lang="pt-BR" dirty="0" smtClean="0"/>
+              <a:t>TCM/3ADS</a:t>
+            </a:r>
+            <a:endParaRPr lang="pt-BR" dirty="0"/>
+          </a:p>
+        </p:txBody>
+      </p:sp>
+      <p:pic>
+        <p:nvPicPr>
+          <p:cNvPr id="2" name="Imagem 1"/>
+          <p:cNvPicPr>
+            <a:picLocks noChangeAspect="1"/>
+          </p:cNvPicPr>
+          <p:nvPr/>
+        </p:nvPicPr>
+        <p:blipFill>
+          <a:blip r:embed="rId2">
+            <a:extLst>
+              <a:ext uri="{28A0092B-C50C-407E-A947-70E740481C1C}">
+                <a14:useLocalDpi xmlns:a14="http://schemas.microsoft.com/office/drawing/2010/main" val="0"/>
+              </a:ext>
+            </a:extLst>
+          </a:blip>
+          <a:stretch>
+            <a:fillRect/>
+          </a:stretch>
+        </p:blipFill>
+        <p:spPr>
+          <a:xfrm>
+            <a:off x="1773953" y="1456560"/>
+            <a:ext cx="5596094" cy="5212800"/>
+          </a:xfrm>
+          <a:prstGeom prst="rect">
+            <a:avLst/>
+          </a:prstGeom>
+        </p:spPr>
+      </p:pic>
+      <p:sp>
+        <p:nvSpPr>
+          <p:cNvPr id="9" name="Retângulo 8"/>
+          <p:cNvSpPr/>
+          <p:nvPr/>
+        </p:nvSpPr>
+        <p:spPr>
+          <a:xfrm>
+            <a:off x="288032" y="1700808"/>
+            <a:ext cx="4572000" cy="307777"/>
+          </a:xfrm>
+          <a:prstGeom prst="rect">
+            <a:avLst/>
+          </a:prstGeom>
+        </p:spPr>
+        <p:txBody>
+          <a:bodyPr>
+            <a:spAutoFit/>
+          </a:bodyPr>
+          <a:lstStyle/>
+          <a:p>
+            <a:r>
+              <a:rPr lang="pt-BR" sz="1400" dirty="0" smtClean="0"/>
+              <a:t>Telas Administrador</a:t>
+            </a:r>
+            <a:endParaRPr lang="pt-BR" sz="1400" dirty="0"/>
+          </a:p>
+        </p:txBody>
+      </p:sp>
+    </p:spTree>
+    <p:extLst>
+      <p:ext uri="{BB962C8B-B14F-4D97-AF65-F5344CB8AC3E}">
+        <p14:creationId xmlns:p14="http://schemas.microsoft.com/office/powerpoint/2010/main" val="2489203823"/>
+      </p:ext>
+    </p:extLst>
+  </p:cSld>
+  <p:clrMapOvr>
+    <a:masterClrMapping/>
+  </p:clrMapOvr>
+  <p:transition spd="med">
+    <p:fade/>
+  </p:transition>
+  <p:timing>
+    <p:tnLst>
+      <p:par>
+        <p:cTn id="1" dur="indefinite" restart="never" nodeType="tmRoot"/>
+      </p:par>
+    </p:tnLst>
+  </p:timing>
+</p:sld>
+</file>
+
+<file path=ppt/slides/slide42.xml><?xml version="1.0" encoding="utf-8"?>
+<p:sld xmlns:a="http://schemas.openxmlformats.org/drawingml/2006/main" xmlns:r="http://schemas.openxmlformats.org/officeDocument/2006/relationships" xmlns:p="http://schemas.openxmlformats.org/presentationml/2006/main">
+  <p:cSld>
+    <p:spTree>
+      <p:nvGrpSpPr>
+        <p:cNvPr id="1" name=""/>
+        <p:cNvGrpSpPr/>
+        <p:nvPr/>
+      </p:nvGrpSpPr>
+      <p:grpSpPr>
+        <a:xfrm>
+          <a:off x="0" y="0"/>
+          <a:ext cx="0" cy="0"/>
+          <a:chOff x="0" y="0"/>
+          <a:chExt cx="0" cy="0"/>
+        </a:xfrm>
+      </p:grpSpPr>
+      <p:sp>
+        <p:nvSpPr>
+          <p:cNvPr id="19458" name="Rectangle 2"/>
+          <p:cNvSpPr>
+            <a:spLocks noGrp="1" noChangeArrowheads="1"/>
+          </p:cNvSpPr>
+          <p:nvPr>
+            <p:ph type="title"/>
+          </p:nvPr>
+        </p:nvSpPr>
+        <p:spPr/>
+        <p:txBody>
+          <a:bodyPr/>
+          <a:lstStyle/>
+          <a:p>
+            <a:r>
+              <a:rPr lang="pt-BR" dirty="0" smtClean="0"/>
+              <a:t>Conclusão</a:t>
+            </a:r>
+            <a:endParaRPr lang="pt-BR" dirty="0"/>
+          </a:p>
+        </p:txBody>
+      </p:sp>
+      <p:sp>
+        <p:nvSpPr>
+          <p:cNvPr id="19459" name="Rectangle 3"/>
+          <p:cNvSpPr>
+            <a:spLocks noGrp="1" noChangeArrowheads="1"/>
+          </p:cNvSpPr>
+          <p:nvPr>
+            <p:ph type="body" idx="1"/>
+          </p:nvPr>
+        </p:nvSpPr>
+        <p:spPr/>
+        <p:txBody>
+          <a:bodyPr/>
+          <a:lstStyle/>
+          <a:p>
+            <a:r>
+              <a:rPr lang="pt-BR" sz="2400" dirty="0" smtClean="0"/>
+              <a:t>O ponto principal do sistema é a possibilidade de controle e gestão que ele oferece para a clínica, além de facilidade para o paciente que for realizar um exame.</a:t>
+            </a:r>
+          </a:p>
+          <a:p>
+            <a:r>
+              <a:rPr lang="pt-BR" sz="2400" dirty="0" smtClean="0"/>
+              <a:t>Um ponto a ser melhorado no sistema é a quantidade pequena de funcionalidades dele.</a:t>
+            </a:r>
+          </a:p>
+          <a:p>
+            <a:r>
+              <a:rPr lang="pt-BR" sz="2400" dirty="0" smtClean="0"/>
+              <a:t>No futuro poderá ser acrescentado um sistema de agendamento de exames online no </a:t>
+            </a:r>
+            <a:r>
+              <a:rPr lang="pt-BR" sz="2400" dirty="0" err="1" smtClean="0"/>
+              <a:t>website</a:t>
+            </a:r>
+            <a:r>
+              <a:rPr lang="pt-BR" sz="2400" dirty="0" smtClean="0"/>
+              <a:t> da clínica e o ajuste do </a:t>
+            </a:r>
+            <a:r>
+              <a:rPr lang="pt-BR" sz="2400" dirty="0" err="1" smtClean="0"/>
+              <a:t>website</a:t>
+            </a:r>
+            <a:r>
+              <a:rPr lang="pt-BR" sz="2400" dirty="0" smtClean="0"/>
+              <a:t> para dispositivos </a:t>
+            </a:r>
+            <a:r>
+              <a:rPr lang="pt-BR" sz="2400" dirty="0" err="1" smtClean="0"/>
+              <a:t>mobile</a:t>
+            </a:r>
+            <a:r>
+              <a:rPr lang="pt-BR" sz="2400" dirty="0" smtClean="0"/>
+              <a:t>.</a:t>
+            </a:r>
+            <a:endParaRPr lang="pt-BR" sz="2400" dirty="0"/>
+          </a:p>
+        </p:txBody>
+      </p:sp>
+      <p:sp>
+        <p:nvSpPr>
+          <p:cNvPr id="6" name="Espaço Reservado para Data 5"/>
+          <p:cNvSpPr>
+            <a:spLocks noGrp="1"/>
+          </p:cNvSpPr>
+          <p:nvPr>
+            <p:ph type="dt" sz="half" idx="10"/>
+          </p:nvPr>
+        </p:nvSpPr>
+        <p:spPr/>
+        <p:txBody>
+          <a:bodyPr/>
+          <a:lstStyle/>
+          <a:p>
+            <a:r>
+              <a:rPr lang="pt-BR" dirty="0" smtClean="0"/>
+              <a:t>22/09/2014</a:t>
+            </a:r>
+          </a:p>
+          <a:p>
+            <a:endParaRPr lang="pt-BR" dirty="0"/>
+          </a:p>
+        </p:txBody>
+      </p:sp>
+      <p:sp>
+        <p:nvSpPr>
+          <p:cNvPr id="7" name="Espaço Reservado para Número de Slide 6"/>
+          <p:cNvSpPr>
+            <a:spLocks noGrp="1"/>
+          </p:cNvSpPr>
+          <p:nvPr>
+            <p:ph type="sldNum" sz="quarter" idx="12"/>
+          </p:nvPr>
+        </p:nvSpPr>
+        <p:spPr/>
+        <p:txBody>
+          <a:bodyPr/>
+          <a:lstStyle/>
+          <a:p>
+            <a:fld id="{516476CB-12D4-456A-BCEE-8469A8C40045}" type="slidenum">
+              <a:rPr lang="pt-BR" smtClean="0"/>
+              <a:pPr/>
+              <a:t>42</a:t>
+            </a:fld>
+            <a:endParaRPr lang="pt-BR" dirty="0"/>
           </a:p>
         </p:txBody>
       </p:sp>
@@ -9600,11 +12244,7 @@
             <a:pPr lvl="0"/>
             <a:r>
               <a:rPr lang="pt-BR" sz="2400" dirty="0" smtClean="0"/>
-              <a:t>Gerar relatórios diários, semanais ou mensais do fluxo de </a:t>
-            </a:r>
-            <a:r>
-              <a:rPr lang="pt-BR" sz="2400" dirty="0" smtClean="0"/>
-              <a:t>exames</a:t>
+              <a:t>Gerar relatórios diários, semanais ou mensais do fluxo de exames</a:t>
             </a:r>
             <a:endParaRPr lang="en-US" sz="2400" dirty="0" smtClean="0"/>
           </a:p>
@@ -9774,7 +12414,6 @@
               <a:rPr lang="pt-BR" sz="2400" dirty="0" smtClean="0"/>
               <a:t> Medicina Diagnóstica</a:t>
             </a:r>
-            <a:endParaRPr lang="pt-BR" sz="2400" dirty="0" smtClean="0"/>
           </a:p>
           <a:p>
             <a:pPr lvl="0"/>
@@ -9795,19 +12434,7 @@
             <a:pPr lvl="0"/>
             <a:r>
               <a:rPr lang="pt-BR" sz="2400" dirty="0" smtClean="0"/>
-              <a:t>Pontos fortes: </a:t>
-            </a:r>
-            <a:r>
-              <a:rPr lang="pt-BR" sz="2400" dirty="0" smtClean="0"/>
-              <a:t>f</a:t>
-            </a:r>
-            <a:r>
-              <a:rPr lang="pt-BR" sz="2400" dirty="0" smtClean="0"/>
-              <a:t>luidez </a:t>
-            </a:r>
-            <a:r>
-              <a:rPr lang="pt-BR" sz="2400" dirty="0" smtClean="0"/>
-              <a:t>do </a:t>
+              <a:t>Pontos fortes: fluidez do </a:t>
             </a:r>
             <a:r>
               <a:rPr lang="pt-BR" sz="2400" dirty="0" err="1" smtClean="0"/>
@@ -9815,19 +12442,7 @@
             </a:r>
             <a:r>
               <a:rPr lang="pt-BR" sz="2400" dirty="0" smtClean="0"/>
-              <a:t> e da </a:t>
-            </a:r>
-            <a:r>
-              <a:rPr lang="pt-BR" sz="2400" dirty="0" smtClean="0"/>
-              <a:t>interface, </a:t>
-            </a:r>
-            <a:r>
-              <a:rPr lang="pt-BR" sz="2400" dirty="0" smtClean="0"/>
-              <a:t>formas de interação do sistema com o usuário e serviços e ferramentas que o sistema oferece para o usuário</a:t>
-            </a:r>
-            <a:r>
-              <a:rPr lang="pt-BR" sz="2400" dirty="0" smtClean="0"/>
-              <a:t>.</a:t>
+              <a:t> e da interface, formas de interação do sistema com o usuário e serviços e ferramentas que o sistema oferece para o usuário.</a:t>
             </a:r>
           </a:p>
           <a:p>
@@ -10376,11 +12991,7 @@
           <a:p>
             <a:r>
               <a:rPr lang="pt-BR" dirty="0" smtClean="0"/>
-              <a:t>IBTA </a:t>
-            </a:r>
-            <a:r>
-              <a:rPr lang="pt-BR" dirty="0" smtClean="0"/>
-              <a:t>Faculdades</a:t>
+              <a:t>IBTA Faculdades</a:t>
             </a:r>
           </a:p>
           <a:p>
@@ -10404,7 +13015,7 @@
           <a:blip r:embed="rId2" cstate="print">
             <a:extLst>
               <a:ext uri="{28A0092B-C50C-407E-A947-70E740481C1C}">
-                <a14:useLocalDpi xmlns:a14="http://schemas.microsoft.com/office/drawing/2010/main" xmlns:lc="http://schemas.openxmlformats.org/drawingml/2006/lockedCanvas" xmlns="" val="0"/>
+                <a14:useLocalDpi xmlns:a14="http://schemas.microsoft.com/office/drawing/2010/main" val="0"/>
               </a:ext>
             </a:extLst>
           </a:blip>

</xml_diff>